<commit_message>
updated ppt + RF files
</commit_message>
<xml_diff>
--- a/unit testing.pptx
+++ b/unit testing.pptx
@@ -275,7 +275,7 @@
           <a:p>
             <a:fld id="{BCB36BD2-D522-6649-9E4C-BF6804760A07}" type="datetimeFigureOut">
               <a:rPr lang="en-CO" smtClean="0"/>
-              <a:t>11/05/22</a:t>
+              <a:t>12/05/22</a:t>
             </a:fld>
             <a:endParaRPr lang="en-CO"/>
           </a:p>
@@ -475,7 +475,7 @@
           <a:p>
             <a:fld id="{BCB36BD2-D522-6649-9E4C-BF6804760A07}" type="datetimeFigureOut">
               <a:rPr lang="en-CO" smtClean="0"/>
-              <a:t>11/05/22</a:t>
+              <a:t>12/05/22</a:t>
             </a:fld>
             <a:endParaRPr lang="en-CO"/>
           </a:p>
@@ -685,7 +685,7 @@
           <a:p>
             <a:fld id="{BCB36BD2-D522-6649-9E4C-BF6804760A07}" type="datetimeFigureOut">
               <a:rPr lang="en-CO" smtClean="0"/>
-              <a:t>11/05/22</a:t>
+              <a:t>12/05/22</a:t>
             </a:fld>
             <a:endParaRPr lang="en-CO"/>
           </a:p>
@@ -885,7 +885,7 @@
           <a:p>
             <a:fld id="{BCB36BD2-D522-6649-9E4C-BF6804760A07}" type="datetimeFigureOut">
               <a:rPr lang="en-CO" smtClean="0"/>
-              <a:t>11/05/22</a:t>
+              <a:t>12/05/22</a:t>
             </a:fld>
             <a:endParaRPr lang="en-CO"/>
           </a:p>
@@ -1161,7 +1161,7 @@
           <a:p>
             <a:fld id="{BCB36BD2-D522-6649-9E4C-BF6804760A07}" type="datetimeFigureOut">
               <a:rPr lang="en-CO" smtClean="0"/>
-              <a:t>11/05/22</a:t>
+              <a:t>12/05/22</a:t>
             </a:fld>
             <a:endParaRPr lang="en-CO"/>
           </a:p>
@@ -1429,7 +1429,7 @@
           <a:p>
             <a:fld id="{BCB36BD2-D522-6649-9E4C-BF6804760A07}" type="datetimeFigureOut">
               <a:rPr lang="en-CO" smtClean="0"/>
-              <a:t>11/05/22</a:t>
+              <a:t>12/05/22</a:t>
             </a:fld>
             <a:endParaRPr lang="en-CO"/>
           </a:p>
@@ -1844,7 +1844,7 @@
           <a:p>
             <a:fld id="{BCB36BD2-D522-6649-9E4C-BF6804760A07}" type="datetimeFigureOut">
               <a:rPr lang="en-CO" smtClean="0"/>
-              <a:t>11/05/22</a:t>
+              <a:t>12/05/22</a:t>
             </a:fld>
             <a:endParaRPr lang="en-CO"/>
           </a:p>
@@ -1986,7 +1986,7 @@
           <a:p>
             <a:fld id="{BCB36BD2-D522-6649-9E4C-BF6804760A07}" type="datetimeFigureOut">
               <a:rPr lang="en-CO" smtClean="0"/>
-              <a:t>11/05/22</a:t>
+              <a:t>12/05/22</a:t>
             </a:fld>
             <a:endParaRPr lang="en-CO"/>
           </a:p>
@@ -2099,7 +2099,7 @@
           <a:p>
             <a:fld id="{BCB36BD2-D522-6649-9E4C-BF6804760A07}" type="datetimeFigureOut">
               <a:rPr lang="en-CO" smtClean="0"/>
-              <a:t>11/05/22</a:t>
+              <a:t>12/05/22</a:t>
             </a:fld>
             <a:endParaRPr lang="en-CO"/>
           </a:p>
@@ -2412,7 +2412,7 @@
           <a:p>
             <a:fld id="{BCB36BD2-D522-6649-9E4C-BF6804760A07}" type="datetimeFigureOut">
               <a:rPr lang="en-CO" smtClean="0"/>
-              <a:t>11/05/22</a:t>
+              <a:t>12/05/22</a:t>
             </a:fld>
             <a:endParaRPr lang="en-CO"/>
           </a:p>
@@ -2701,7 +2701,7 @@
           <a:p>
             <a:fld id="{BCB36BD2-D522-6649-9E4C-BF6804760A07}" type="datetimeFigureOut">
               <a:rPr lang="en-CO" smtClean="0"/>
-              <a:t>11/05/22</a:t>
+              <a:t>12/05/22</a:t>
             </a:fld>
             <a:endParaRPr lang="en-CO"/>
           </a:p>
@@ -2944,7 +2944,7 @@
           <a:p>
             <a:fld id="{BCB36BD2-D522-6649-9E4C-BF6804760A07}" type="datetimeFigureOut">
               <a:rPr lang="en-CO" smtClean="0"/>
-              <a:t>11/05/22</a:t>
+              <a:t>12/05/22</a:t>
             </a:fld>
             <a:endParaRPr lang="en-CO"/>
           </a:p>
@@ -4650,128 +4650,221 @@
         </p:nvSpPr>
         <p:spPr>
           <a:xfrm>
-            <a:off x="838200" y="1503124"/>
-            <a:ext cx="10515600" cy="5165116"/>
+            <a:off x="475989" y="1503124"/>
+            <a:ext cx="11285952" cy="5354876"/>
           </a:xfrm>
         </p:spPr>
         <p:txBody>
           <a:bodyPr>
-            <a:normAutofit fontScale="92500" lnSpcReduction="20000"/>
+            <a:normAutofit fontScale="70000" lnSpcReduction="20000"/>
           </a:bodyPr>
           <a:lstStyle/>
           <a:p>
             <a:r>
-              <a:rPr lang="en-CO" dirty="0"/>
+              <a:rPr lang="en-CO" sz="3300" dirty="0"/>
               <a:t>Mocha is used as a framework for unit testing with JS. It let us to test our code in different ways in a structured code. </a:t>
             </a:r>
           </a:p>
           <a:p>
             <a:r>
-              <a:rPr lang="en-CO" dirty="0"/>
+              <a:rPr lang="en-CO" sz="3300" dirty="0"/>
               <a:t>Mocha Basics: describe, context, it.</a:t>
             </a:r>
           </a:p>
           <a:p>
             <a:pPr lvl="1"/>
             <a:r>
-              <a:rPr lang="en-CO" dirty="0"/>
+              <a:rPr lang="en-CO" sz="3300" dirty="0"/>
               <a:t>Describe: used to logically distribute your test</a:t>
             </a:r>
           </a:p>
           <a:p>
             <a:pPr lvl="1"/>
             <a:r>
-              <a:rPr lang="en-US" dirty="0"/>
+              <a:rPr lang="en-US" sz="3300" dirty="0"/>
               <a:t>I</a:t>
             </a:r>
             <a:r>
-              <a:rPr lang="en-CO" dirty="0"/>
+              <a:rPr lang="en-CO" sz="3300" dirty="0"/>
               <a:t>t: identifies individual test.</a:t>
             </a:r>
           </a:p>
           <a:p>
             <a:pPr lvl="1"/>
             <a:r>
-              <a:rPr lang="en-CO" dirty="0"/>
+              <a:rPr lang="en-CO" sz="3300" dirty="0"/>
               <a:t>Context: alias for describe</a:t>
             </a:r>
           </a:p>
           <a:p>
             <a:pPr lvl="1"/>
             <a:r>
-              <a:rPr lang="en-CO" dirty="0"/>
+              <a:rPr lang="en-CO" sz="3300" dirty="0"/>
               <a:t>Specify: alias for it	</a:t>
             </a:r>
           </a:p>
           <a:p>
-            <a:r>
-              <a:rPr lang="en-CO" dirty="0"/>
-              <a:t>Syntax: Ej: </a:t>
-            </a:r>
-            <a:r>
-              <a:rPr lang="en-CO" sz="1600" dirty="0">
-                <a:latin typeface="Consolas" panose="020B0609020204030204" pitchFamily="49" charset="0"/>
-                <a:cs typeface="Consolas" panose="020B0609020204030204" pitchFamily="49" charset="0"/>
-              </a:rPr>
-              <a:t>describe(‘test of my class’, () =&gt; {</a:t>
-            </a:r>
-          </a:p>
-          <a:p>
-            <a:pPr marL="0" indent="0">
-              <a:buNone/>
-            </a:pPr>
-            <a:r>
-              <a:rPr lang="en-CO" sz="1600" dirty="0">
-                <a:latin typeface="Consolas" panose="020B0609020204030204" pitchFamily="49" charset="0"/>
-                <a:cs typeface="Consolas" panose="020B0609020204030204" pitchFamily="49" charset="0"/>
-              </a:rPr>
-              <a:t>			context(‘empty strings’, () =&gt; {</a:t>
-            </a:r>
-          </a:p>
-          <a:p>
-            <a:pPr marL="0" indent="0">
-              <a:buNone/>
-            </a:pPr>
-            <a:r>
-              <a:rPr lang="en-CO" sz="1600" dirty="0">
-                <a:latin typeface="Consolas" panose="020B0609020204030204" pitchFamily="49" charset="0"/>
-                <a:cs typeface="Consolas" panose="020B0609020204030204" pitchFamily="49" charset="0"/>
-              </a:rPr>
-              <a:t>				it(‘should fail with empty name param’, () =&gt; {</a:t>
-            </a:r>
-          </a:p>
-          <a:p>
-            <a:pPr marL="0" indent="0">
-              <a:buNone/>
-            </a:pPr>
-            <a:r>
-              <a:rPr lang="en-CO" sz="1600" dirty="0">
-                <a:latin typeface="Consolas" panose="020B0609020204030204" pitchFamily="49" charset="0"/>
-                <a:cs typeface="Consolas" panose="020B0609020204030204" pitchFamily="49" charset="0"/>
-              </a:rPr>
-              <a:t>					YOUR_TEST;</a:t>
-            </a:r>
-          </a:p>
-          <a:p>
-            <a:pPr marL="0" indent="0">
-              <a:buNone/>
-            </a:pPr>
-            <a:r>
-              <a:rPr lang="en-CO" sz="1600" dirty="0">
-                <a:latin typeface="Consolas" panose="020B0609020204030204" pitchFamily="49" charset="0"/>
-                <a:cs typeface="Consolas" panose="020B0609020204030204" pitchFamily="49" charset="0"/>
-              </a:rPr>
-              <a:t>					</a:t>
-            </a:r>
-            <a:r>
-              <a:rPr lang="en-US" sz="1600" dirty="0" err="1">
+            <a:pPr>
+              <a:lnSpc>
+                <a:spcPct val="120000"/>
+              </a:lnSpc>
+              <a:spcBef>
+                <a:spcPts val="0"/>
+              </a:spcBef>
+            </a:pPr>
+            <a:r>
+              <a:rPr lang="en-CO" sz="3300" dirty="0"/>
+              <a:t>Syntax Ex:     </a:t>
+            </a:r>
+          </a:p>
+          <a:p>
+            <a:pPr marL="0" indent="0">
+              <a:lnSpc>
+                <a:spcPct val="120000"/>
+              </a:lnSpc>
+              <a:spcBef>
+                <a:spcPts val="0"/>
+              </a:spcBef>
+              <a:buNone/>
+            </a:pPr>
+            <a:r>
+              <a:rPr lang="en-US" sz="2200" dirty="0">
+                <a:latin typeface="Consolas" panose="020B0609020204030204" pitchFamily="49" charset="0"/>
+                <a:cs typeface="Consolas" panose="020B0609020204030204" pitchFamily="49" charset="0"/>
+              </a:rPr>
+              <a:t>const { assert, expect } = require(`chai`);</a:t>
+            </a:r>
+          </a:p>
+          <a:p>
+            <a:pPr marL="0" indent="0">
+              <a:lnSpc>
+                <a:spcPct val="120000"/>
+              </a:lnSpc>
+              <a:spcBef>
+                <a:spcPts val="0"/>
+              </a:spcBef>
+              <a:buNone/>
+            </a:pPr>
+            <a:r>
+              <a:rPr lang="en-US" sz="2200" dirty="0">
+                <a:latin typeface="Consolas" panose="020B0609020204030204" pitchFamily="49" charset="0"/>
+                <a:cs typeface="Consolas" panose="020B0609020204030204" pitchFamily="49" charset="0"/>
+              </a:rPr>
+              <a:t>describe(`test of my class`, () =&gt; {</a:t>
+            </a:r>
+          </a:p>
+          <a:p>
+            <a:pPr marL="0" indent="0">
+              <a:lnSpc>
+                <a:spcPct val="120000"/>
+              </a:lnSpc>
+              <a:spcBef>
+                <a:spcPts val="0"/>
+              </a:spcBef>
+              <a:buNone/>
+            </a:pPr>
+            <a:r>
+              <a:rPr lang="en-US" sz="2200" dirty="0">
+                <a:latin typeface="Consolas" panose="020B0609020204030204" pitchFamily="49" charset="0"/>
+                <a:cs typeface="Consolas" panose="020B0609020204030204" pitchFamily="49" charset="0"/>
+              </a:rPr>
+              <a:t>  context(`empty strings`, () =&gt; {</a:t>
+            </a:r>
+          </a:p>
+          <a:p>
+            <a:pPr marL="0" indent="0">
+              <a:lnSpc>
+                <a:spcPct val="120000"/>
+              </a:lnSpc>
+              <a:spcBef>
+                <a:spcPts val="0"/>
+              </a:spcBef>
+              <a:buNone/>
+            </a:pPr>
+            <a:r>
+              <a:rPr lang="en-US" sz="2200" dirty="0">
+                <a:latin typeface="Consolas" panose="020B0609020204030204" pitchFamily="49" charset="0"/>
+                <a:cs typeface="Consolas" panose="020B0609020204030204" pitchFamily="49" charset="0"/>
+              </a:rPr>
+              <a:t>    it(`should fail with empty name param`, () =&gt; {</a:t>
+            </a:r>
+          </a:p>
+          <a:p>
+            <a:pPr marL="0" indent="0">
+              <a:lnSpc>
+                <a:spcPct val="120000"/>
+              </a:lnSpc>
+              <a:spcBef>
+                <a:spcPts val="0"/>
+              </a:spcBef>
+              <a:buNone/>
+            </a:pPr>
+            <a:r>
+              <a:rPr lang="en-US" sz="2200" dirty="0">
+                <a:latin typeface="Consolas" panose="020B0609020204030204" pitchFamily="49" charset="0"/>
+                <a:cs typeface="Consolas" panose="020B0609020204030204" pitchFamily="49" charset="0"/>
+              </a:rPr>
+              <a:t>      let </a:t>
+            </a:r>
+            <a:r>
+              <a:rPr lang="en-US" sz="2200" dirty="0" err="1">
+                <a:latin typeface="Consolas" panose="020B0609020204030204" pitchFamily="49" charset="0"/>
+                <a:cs typeface="Consolas" panose="020B0609020204030204" pitchFamily="49" charset="0"/>
+              </a:rPr>
+              <a:t>actualValue</a:t>
+            </a:r>
+            <a:r>
+              <a:rPr lang="en-US" sz="2200" dirty="0">
+                <a:latin typeface="Consolas" panose="020B0609020204030204" pitchFamily="49" charset="0"/>
+                <a:cs typeface="Consolas" panose="020B0609020204030204" pitchFamily="49" charset="0"/>
+              </a:rPr>
+              <a:t> = 1;</a:t>
+            </a:r>
+          </a:p>
+          <a:p>
+            <a:pPr marL="0" indent="0">
+              <a:lnSpc>
+                <a:spcPct val="120000"/>
+              </a:lnSpc>
+              <a:spcBef>
+                <a:spcPts val="0"/>
+              </a:spcBef>
+              <a:buNone/>
+            </a:pPr>
+            <a:r>
+              <a:rPr lang="en-US" sz="2200" dirty="0">
+                <a:latin typeface="Consolas" panose="020B0609020204030204" pitchFamily="49" charset="0"/>
+                <a:cs typeface="Consolas" panose="020B0609020204030204" pitchFamily="49" charset="0"/>
+              </a:rPr>
+              <a:t>      //TODO_YOUR_TEST;</a:t>
+            </a:r>
+          </a:p>
+          <a:p>
+            <a:pPr marL="0" indent="0">
+              <a:lnSpc>
+                <a:spcPct val="120000"/>
+              </a:lnSpc>
+              <a:spcBef>
+                <a:spcPts val="0"/>
+              </a:spcBef>
+              <a:buNone/>
+            </a:pPr>
+            <a:r>
+              <a:rPr lang="en-US" sz="2200" dirty="0">
+                <a:latin typeface="Consolas" panose="020B0609020204030204" pitchFamily="49" charset="0"/>
+                <a:cs typeface="Consolas" panose="020B0609020204030204" pitchFamily="49" charset="0"/>
+              </a:rPr>
+              <a:t>      </a:t>
+            </a:r>
+            <a:r>
+              <a:rPr lang="en-US" sz="2200" dirty="0" err="1">
                 <a:latin typeface="Consolas" panose="020B0609020204030204" pitchFamily="49" charset="0"/>
                 <a:cs typeface="Consolas" panose="020B0609020204030204" pitchFamily="49" charset="0"/>
               </a:rPr>
               <a:t>assert.equal</a:t>
             </a:r>
             <a:r>
-              <a:rPr lang="en-US" sz="1600" dirty="0">
+              <a:rPr lang="en-US" sz="2200" dirty="0">
                 <a:latin typeface="Consolas" panose="020B0609020204030204" pitchFamily="49" charset="0"/>
                 <a:cs typeface="Consolas" panose="020B0609020204030204" pitchFamily="49" charset="0"/>
               </a:rPr>
@@ -4780,73 +4873,135 @@
           </a:p>
           <a:p>
             <a:pPr marL="0" indent="0">
-              <a:buNone/>
-            </a:pPr>
-            <a:r>
-              <a:rPr lang="en-US" sz="1600" dirty="0">
-                <a:latin typeface="Consolas" panose="020B0609020204030204" pitchFamily="49" charset="0"/>
-                <a:cs typeface="Consolas" panose="020B0609020204030204" pitchFamily="49" charset="0"/>
-              </a:rPr>
-              <a:t>					expect(result).</a:t>
-            </a:r>
-            <a:r>
-              <a:rPr lang="en-US" sz="1600" dirty="0" err="1">
+              <a:lnSpc>
+                <a:spcPct val="120000"/>
+              </a:lnSpc>
+              <a:spcBef>
+                <a:spcPts val="0"/>
+              </a:spcBef>
+              <a:buNone/>
+            </a:pPr>
+            <a:r>
+              <a:rPr lang="en-US" sz="2200" dirty="0">
+                <a:latin typeface="Consolas" panose="020B0609020204030204" pitchFamily="49" charset="0"/>
+                <a:cs typeface="Consolas" panose="020B0609020204030204" pitchFamily="49" charset="0"/>
+              </a:rPr>
+              <a:t>      </a:t>
+            </a:r>
+            <a:r>
+              <a:rPr lang="en-US" sz="2200" dirty="0" err="1">
+                <a:latin typeface="Consolas" panose="020B0609020204030204" pitchFamily="49" charset="0"/>
+                <a:cs typeface="Consolas" panose="020B0609020204030204" pitchFamily="49" charset="0"/>
+              </a:rPr>
+              <a:t>actualValue</a:t>
+            </a:r>
+            <a:r>
+              <a:rPr lang="en-US" sz="2200" dirty="0">
+                <a:latin typeface="Consolas" panose="020B0609020204030204" pitchFamily="49" charset="0"/>
+                <a:cs typeface="Consolas" panose="020B0609020204030204" pitchFamily="49" charset="0"/>
+              </a:rPr>
+              <a:t> = 3;</a:t>
+            </a:r>
+          </a:p>
+          <a:p>
+            <a:pPr marL="0" indent="0">
+              <a:lnSpc>
+                <a:spcPct val="120000"/>
+              </a:lnSpc>
+              <a:spcBef>
+                <a:spcPts val="0"/>
+              </a:spcBef>
+              <a:buNone/>
+            </a:pPr>
+            <a:r>
+              <a:rPr lang="en-US" sz="2200" dirty="0">
+                <a:latin typeface="Consolas" panose="020B0609020204030204" pitchFamily="49" charset="0"/>
+                <a:cs typeface="Consolas" panose="020B0609020204030204" pitchFamily="49" charset="0"/>
+              </a:rPr>
+              <a:t>      expect(</a:t>
+            </a:r>
+            <a:r>
+              <a:rPr lang="en-US" sz="2200" dirty="0" err="1">
+                <a:latin typeface="Consolas" panose="020B0609020204030204" pitchFamily="49" charset="0"/>
+                <a:cs typeface="Consolas" panose="020B0609020204030204" pitchFamily="49" charset="0"/>
+              </a:rPr>
+              <a:t>actualValue</a:t>
+            </a:r>
+            <a:r>
+              <a:rPr lang="en-US" sz="2200" dirty="0">
+                <a:latin typeface="Consolas" panose="020B0609020204030204" pitchFamily="49" charset="0"/>
+                <a:cs typeface="Consolas" panose="020B0609020204030204" pitchFamily="49" charset="0"/>
+              </a:rPr>
+              <a:t>).</a:t>
+            </a:r>
+            <a:r>
+              <a:rPr lang="en-US" sz="2200" dirty="0" err="1">
                 <a:latin typeface="Consolas" panose="020B0609020204030204" pitchFamily="49" charset="0"/>
                 <a:cs typeface="Consolas" panose="020B0609020204030204" pitchFamily="49" charset="0"/>
               </a:rPr>
               <a:t>to.equal</a:t>
             </a:r>
             <a:r>
-              <a:rPr lang="en-US" sz="1600" dirty="0">
+              <a:rPr lang="en-US" sz="2200" dirty="0">
                 <a:latin typeface="Consolas" panose="020B0609020204030204" pitchFamily="49" charset="0"/>
                 <a:cs typeface="Consolas" panose="020B0609020204030204" pitchFamily="49" charset="0"/>
               </a:rPr>
               <a:t>(3);</a:t>
             </a:r>
-            <a:endParaRPr lang="en-CO" sz="1600" dirty="0">
-              <a:latin typeface="Consolas" panose="020B0609020204030204" pitchFamily="49" charset="0"/>
-              <a:cs typeface="Consolas" panose="020B0609020204030204" pitchFamily="49" charset="0"/>
-            </a:endParaRPr>
-          </a:p>
-          <a:p>
-            <a:pPr marL="0" indent="0">
-              <a:buNone/>
-            </a:pPr>
-            <a:r>
-              <a:rPr lang="en-CO" sz="1600" dirty="0">
-                <a:latin typeface="Consolas" panose="020B0609020204030204" pitchFamily="49" charset="0"/>
-                <a:cs typeface="Consolas" panose="020B0609020204030204" pitchFamily="49" charset="0"/>
-              </a:rPr>
-              <a:t>				})</a:t>
-            </a:r>
-          </a:p>
-          <a:p>
-            <a:pPr marL="0" indent="0">
-              <a:buNone/>
-            </a:pPr>
-            <a:r>
-              <a:rPr lang="en-CO" sz="1600" dirty="0">
-                <a:latin typeface="Consolas" panose="020B0609020204030204" pitchFamily="49" charset="0"/>
-                <a:cs typeface="Consolas" panose="020B0609020204030204" pitchFamily="49" charset="0"/>
-              </a:rPr>
-              <a:t>			})</a:t>
-            </a:r>
-          </a:p>
-          <a:p>
-            <a:pPr marL="0" indent="0">
-              <a:buNone/>
-            </a:pPr>
-            <a:r>
-              <a:rPr lang="en-CO" sz="1600" dirty="0">
-                <a:latin typeface="Consolas" panose="020B0609020204030204" pitchFamily="49" charset="0"/>
-                <a:cs typeface="Consolas" panose="020B0609020204030204" pitchFamily="49" charset="0"/>
-              </a:rPr>
-              <a:t>		})</a:t>
-            </a:r>
-          </a:p>
-          <a:p>
-            <a:pPr lvl="4"/>
-            <a:endParaRPr lang="en-CO" dirty="0"/>
+          </a:p>
+          <a:p>
+            <a:pPr marL="0" indent="0">
+              <a:lnSpc>
+                <a:spcPct val="120000"/>
+              </a:lnSpc>
+              <a:spcBef>
+                <a:spcPts val="0"/>
+              </a:spcBef>
+              <a:buNone/>
+            </a:pPr>
+            <a:r>
+              <a:rPr lang="en-US" sz="2200" dirty="0">
+                <a:latin typeface="Consolas" panose="020B0609020204030204" pitchFamily="49" charset="0"/>
+                <a:cs typeface="Consolas" panose="020B0609020204030204" pitchFamily="49" charset="0"/>
+              </a:rPr>
+              <a:t>    })</a:t>
+            </a:r>
+          </a:p>
+          <a:p>
+            <a:pPr marL="0" indent="0">
+              <a:lnSpc>
+                <a:spcPct val="120000"/>
+              </a:lnSpc>
+              <a:spcBef>
+                <a:spcPts val="0"/>
+              </a:spcBef>
+              <a:buNone/>
+            </a:pPr>
+            <a:r>
+              <a:rPr lang="en-US" sz="2200" dirty="0">
+                <a:latin typeface="Consolas" panose="020B0609020204030204" pitchFamily="49" charset="0"/>
+                <a:cs typeface="Consolas" panose="020B0609020204030204" pitchFamily="49" charset="0"/>
+              </a:rPr>
+              <a:t>  })</a:t>
+            </a:r>
+          </a:p>
+          <a:p>
+            <a:pPr marL="0" indent="0">
+              <a:lnSpc>
+                <a:spcPct val="120000"/>
+              </a:lnSpc>
+              <a:spcBef>
+                <a:spcPts val="0"/>
+              </a:spcBef>
+              <a:buNone/>
+            </a:pPr>
+            <a:r>
+              <a:rPr lang="en-US" sz="2200" dirty="0">
+                <a:latin typeface="Consolas" panose="020B0609020204030204" pitchFamily="49" charset="0"/>
+                <a:cs typeface="Consolas" panose="020B0609020204030204" pitchFamily="49" charset="0"/>
+              </a:rPr>
+              <a:t>})</a:t>
+            </a:r>
           </a:p>
         </p:txBody>
       </p:sp>
@@ -5080,22 +5235,65 @@
         <p:spPr/>
         <p:txBody>
           <a:bodyPr>
-            <a:normAutofit fontScale="85000" lnSpcReduction="20000"/>
+            <a:normAutofit fontScale="77500" lnSpcReduction="20000"/>
           </a:bodyPr>
           <a:lstStyle/>
           <a:p>
+            <a:pPr marL="0" indent="0">
+              <a:buNone/>
+            </a:pPr>
             <a:r>
               <a:rPr lang="en-US" sz="2600" dirty="0">
                 <a:latin typeface="Consolas" panose="020B0609020204030204" pitchFamily="49" charset="0"/>
                 <a:cs typeface="Consolas" panose="020B0609020204030204" pitchFamily="49" charset="0"/>
               </a:rPr>
-              <a:t>expect({name : 'foo'}).</a:t>
+              <a:t>      expect({name : `foo`}).</a:t>
             </a:r>
             <a:r>
               <a:rPr lang="en-US" sz="2600" dirty="0" err="1">
                 <a:latin typeface="Consolas" panose="020B0609020204030204" pitchFamily="49" charset="0"/>
                 <a:cs typeface="Consolas" panose="020B0609020204030204" pitchFamily="49" charset="0"/>
               </a:rPr>
+              <a:t>to.have.property</a:t>
+            </a:r>
+            <a:r>
+              <a:rPr lang="en-US" sz="2600" dirty="0">
+                <a:latin typeface="Consolas" panose="020B0609020204030204" pitchFamily="49" charset="0"/>
+                <a:cs typeface="Consolas" panose="020B0609020204030204" pitchFamily="49" charset="0"/>
+              </a:rPr>
+              <a:t>(`name`).</a:t>
+            </a:r>
+            <a:r>
+              <a:rPr lang="en-US" sz="2600" dirty="0" err="1">
+                <a:latin typeface="Consolas" panose="020B0609020204030204" pitchFamily="49" charset="0"/>
+                <a:cs typeface="Consolas" panose="020B0609020204030204" pitchFamily="49" charset="0"/>
+              </a:rPr>
+              <a:t>to.equal</a:t>
+            </a:r>
+            <a:r>
+              <a:rPr lang="en-US" sz="2600" dirty="0">
+                <a:latin typeface="Consolas" panose="020B0609020204030204" pitchFamily="49" charset="0"/>
+                <a:cs typeface="Consolas" panose="020B0609020204030204" pitchFamily="49" charset="0"/>
+              </a:rPr>
+              <a:t>(`foo`); </a:t>
+            </a:r>
+          </a:p>
+          <a:p>
+            <a:pPr marL="0" indent="0">
+              <a:buNone/>
+            </a:pPr>
+            <a:r>
+              <a:rPr lang="en-US" sz="2600" dirty="0">
+                <a:latin typeface="Consolas" panose="020B0609020204030204" pitchFamily="49" charset="0"/>
+                <a:cs typeface="Consolas" panose="020B0609020204030204" pitchFamily="49" charset="0"/>
+              </a:rPr>
+              <a:t>      expect({name : `foo`}).</a:t>
+            </a:r>
+            <a:r>
+              <a:rPr lang="en-US" sz="2600" dirty="0" err="1">
+                <a:latin typeface="Consolas" panose="020B0609020204030204" pitchFamily="49" charset="0"/>
+                <a:cs typeface="Consolas" panose="020B0609020204030204" pitchFamily="49" charset="0"/>
+              </a:rPr>
               <a:t>to.deep.equal</a:t>
             </a:r>
             <a:r>
@@ -5103,36 +5301,195 @@
                 <a:latin typeface="Consolas" panose="020B0609020204030204" pitchFamily="49" charset="0"/>
                 <a:cs typeface="Consolas" panose="020B0609020204030204" pitchFamily="49" charset="0"/>
               </a:rPr>
-              <a:t>({name: 'foo'});</a:t>
-            </a:r>
-          </a:p>
-          <a:p>
+              <a:t>({name: `foo`});</a:t>
+            </a:r>
+          </a:p>
+          <a:p>
+            <a:pPr marL="0" indent="0">
+              <a:buNone/>
+            </a:pPr>
             <a:r>
               <a:rPr lang="en-US" sz="2600" dirty="0">
                 <a:latin typeface="Consolas" panose="020B0609020204030204" pitchFamily="49" charset="0"/>
                 <a:cs typeface="Consolas" panose="020B0609020204030204" pitchFamily="49" charset="0"/>
               </a:rPr>
-              <a:t>expect({name : 'foo'}).</a:t>
+              <a:t>      expect(5 &gt; 8).</a:t>
             </a:r>
             <a:r>
               <a:rPr lang="en-US" sz="2600" dirty="0" err="1">
                 <a:latin typeface="Consolas" panose="020B0609020204030204" pitchFamily="49" charset="0"/>
                 <a:cs typeface="Consolas" panose="020B0609020204030204" pitchFamily="49" charset="0"/>
               </a:rPr>
-              <a:t>to.have.property</a:t>
+              <a:t>to.be.false</a:t>
             </a:r>
             <a:r>
               <a:rPr lang="en-US" sz="2600" dirty="0">
                 <a:latin typeface="Consolas" panose="020B0609020204030204" pitchFamily="49" charset="0"/>
                 <a:cs typeface="Consolas" panose="020B0609020204030204" pitchFamily="49" charset="0"/>
               </a:rPr>
-              <a:t>('name').</a:t>
+              <a:t>;</a:t>
+            </a:r>
+          </a:p>
+          <a:p>
+            <a:pPr marL="0" indent="0">
+              <a:buNone/>
+            </a:pPr>
+            <a:r>
+              <a:rPr lang="en-US" sz="2600" dirty="0">
+                <a:latin typeface="Consolas" panose="020B0609020204030204" pitchFamily="49" charset="0"/>
+                <a:cs typeface="Consolas" panose="020B0609020204030204" pitchFamily="49" charset="0"/>
+              </a:rPr>
+              <a:t>      expect({}).</a:t>
             </a:r>
             <a:r>
               <a:rPr lang="en-US" sz="2600" dirty="0" err="1">
                 <a:latin typeface="Consolas" panose="020B0609020204030204" pitchFamily="49" charset="0"/>
                 <a:cs typeface="Consolas" panose="020B0609020204030204" pitchFamily="49" charset="0"/>
               </a:rPr>
+              <a:t>to.be.a</a:t>
+            </a:r>
+            <a:r>
+              <a:rPr lang="en-US" sz="2600" dirty="0">
+                <a:latin typeface="Consolas" panose="020B0609020204030204" pitchFamily="49" charset="0"/>
+                <a:cs typeface="Consolas" panose="020B0609020204030204" pitchFamily="49" charset="0"/>
+              </a:rPr>
+              <a:t>(`object`);</a:t>
+            </a:r>
+          </a:p>
+          <a:p>
+            <a:pPr marL="0" indent="0">
+              <a:buNone/>
+            </a:pPr>
+            <a:r>
+              <a:rPr lang="en-US" sz="2600" dirty="0">
+                <a:latin typeface="Consolas" panose="020B0609020204030204" pitchFamily="49" charset="0"/>
+                <a:cs typeface="Consolas" panose="020B0609020204030204" pitchFamily="49" charset="0"/>
+              </a:rPr>
+              <a:t>      expect({}).</a:t>
+            </a:r>
+            <a:r>
+              <a:rPr lang="en-US" sz="2600" dirty="0" err="1">
+                <a:latin typeface="Consolas" panose="020B0609020204030204" pitchFamily="49" charset="0"/>
+                <a:cs typeface="Consolas" panose="020B0609020204030204" pitchFamily="49" charset="0"/>
+              </a:rPr>
+              <a:t>to.be.empty</a:t>
+            </a:r>
+            <a:r>
+              <a:rPr lang="en-US" sz="2600" dirty="0">
+                <a:latin typeface="Consolas" panose="020B0609020204030204" pitchFamily="49" charset="0"/>
+                <a:cs typeface="Consolas" panose="020B0609020204030204" pitchFamily="49" charset="0"/>
+              </a:rPr>
+              <a:t>;</a:t>
+            </a:r>
+          </a:p>
+          <a:p>
+            <a:pPr marL="0" indent="0">
+              <a:buNone/>
+            </a:pPr>
+            <a:r>
+              <a:rPr lang="en-US" sz="2600" dirty="0">
+                <a:latin typeface="Consolas" panose="020B0609020204030204" pitchFamily="49" charset="0"/>
+                <a:cs typeface="Consolas" panose="020B0609020204030204" pitchFamily="49" charset="0"/>
+              </a:rPr>
+              <a:t>      expect(`foo`).</a:t>
+            </a:r>
+            <a:r>
+              <a:rPr lang="en-US" sz="2600" dirty="0" err="1">
+                <a:latin typeface="Consolas" panose="020B0609020204030204" pitchFamily="49" charset="0"/>
+                <a:cs typeface="Consolas" panose="020B0609020204030204" pitchFamily="49" charset="0"/>
+              </a:rPr>
+              <a:t>to.be.a</a:t>
+            </a:r>
+            <a:r>
+              <a:rPr lang="en-US" sz="2600" dirty="0">
+                <a:latin typeface="Consolas" panose="020B0609020204030204" pitchFamily="49" charset="0"/>
+                <a:cs typeface="Consolas" panose="020B0609020204030204" pitchFamily="49" charset="0"/>
+              </a:rPr>
+              <a:t>(`string`);</a:t>
+            </a:r>
+          </a:p>
+          <a:p>
+            <a:pPr marL="0" indent="0">
+              <a:buNone/>
+            </a:pPr>
+            <a:r>
+              <a:rPr lang="en-US" sz="2600" dirty="0">
+                <a:latin typeface="Consolas" panose="020B0609020204030204" pitchFamily="49" charset="0"/>
+                <a:cs typeface="Consolas" panose="020B0609020204030204" pitchFamily="49" charset="0"/>
+              </a:rPr>
+              <a:t>      expect(3).</a:t>
+            </a:r>
+            <a:r>
+              <a:rPr lang="en-US" sz="2600" dirty="0" err="1">
+                <a:latin typeface="Consolas" panose="020B0609020204030204" pitchFamily="49" charset="0"/>
+                <a:cs typeface="Consolas" panose="020B0609020204030204" pitchFamily="49" charset="0"/>
+              </a:rPr>
+              <a:t>to.be.a</a:t>
+            </a:r>
+            <a:r>
+              <a:rPr lang="en-US" sz="2600" dirty="0">
+                <a:latin typeface="Consolas" panose="020B0609020204030204" pitchFamily="49" charset="0"/>
+                <a:cs typeface="Consolas" panose="020B0609020204030204" pitchFamily="49" charset="0"/>
+              </a:rPr>
+              <a:t>(`number`);</a:t>
+            </a:r>
+          </a:p>
+          <a:p>
+            <a:pPr marL="0" indent="0">
+              <a:buNone/>
+            </a:pPr>
+            <a:r>
+              <a:rPr lang="en-US" sz="2600" dirty="0">
+                <a:latin typeface="Consolas" panose="020B0609020204030204" pitchFamily="49" charset="0"/>
+                <a:cs typeface="Consolas" panose="020B0609020204030204" pitchFamily="49" charset="0"/>
+              </a:rPr>
+              <a:t>      expect(`bar`).</a:t>
+            </a:r>
+            <a:r>
+              <a:rPr lang="en-US" sz="2600" dirty="0" err="1">
+                <a:latin typeface="Consolas" panose="020B0609020204030204" pitchFamily="49" charset="0"/>
+                <a:cs typeface="Consolas" panose="020B0609020204030204" pitchFamily="49" charset="0"/>
+              </a:rPr>
+              <a:t>to.be.a</a:t>
+            </a:r>
+            <a:r>
+              <a:rPr lang="en-US" sz="2600" dirty="0">
+                <a:latin typeface="Consolas" panose="020B0609020204030204" pitchFamily="49" charset="0"/>
+                <a:cs typeface="Consolas" panose="020B0609020204030204" pitchFamily="49" charset="0"/>
+              </a:rPr>
+              <a:t>(`string`).</a:t>
+            </a:r>
+            <a:r>
+              <a:rPr lang="en-US" sz="2600" dirty="0" err="1">
+                <a:latin typeface="Consolas" panose="020B0609020204030204" pitchFamily="49" charset="0"/>
+                <a:cs typeface="Consolas" panose="020B0609020204030204" pitchFamily="49" charset="0"/>
+              </a:rPr>
+              <a:t>with.lengthOf</a:t>
+            </a:r>
+            <a:r>
+              <a:rPr lang="en-US" sz="2600" dirty="0">
+                <a:latin typeface="Consolas" panose="020B0609020204030204" pitchFamily="49" charset="0"/>
+                <a:cs typeface="Consolas" panose="020B0609020204030204" pitchFamily="49" charset="0"/>
+              </a:rPr>
+              <a:t>(3);</a:t>
+            </a:r>
+          </a:p>
+          <a:p>
+            <a:pPr marL="0" indent="0">
+              <a:buNone/>
+            </a:pPr>
+            <a:r>
+              <a:rPr lang="en-US" sz="2600" dirty="0">
+                <a:latin typeface="Consolas" panose="020B0609020204030204" pitchFamily="49" charset="0"/>
+                <a:cs typeface="Consolas" panose="020B0609020204030204" pitchFamily="49" charset="0"/>
+              </a:rPr>
+              <a:t>      expect([1,2,3].length).</a:t>
+            </a:r>
+            <a:r>
+              <a:rPr lang="en-US" sz="2600" dirty="0" err="1">
+                <a:latin typeface="Consolas" panose="020B0609020204030204" pitchFamily="49" charset="0"/>
+                <a:cs typeface="Consolas" panose="020B0609020204030204" pitchFamily="49" charset="0"/>
+              </a:rPr>
               <a:t>to.equal</a:t>
             </a:r>
             <a:r>
@@ -5140,23 +5497,26 @@
                 <a:latin typeface="Consolas" panose="020B0609020204030204" pitchFamily="49" charset="0"/>
                 <a:cs typeface="Consolas" panose="020B0609020204030204" pitchFamily="49" charset="0"/>
               </a:rPr>
-              <a:t>('foo');</a:t>
-            </a:r>
-          </a:p>
-          <a:p>
+              <a:t>(3);</a:t>
+            </a:r>
+          </a:p>
+          <a:p>
+            <a:pPr marL="0" indent="0">
+              <a:buNone/>
+            </a:pPr>
             <a:r>
               <a:rPr lang="en-US" sz="2600" dirty="0">
                 <a:latin typeface="Consolas" panose="020B0609020204030204" pitchFamily="49" charset="0"/>
                 <a:cs typeface="Consolas" panose="020B0609020204030204" pitchFamily="49" charset="0"/>
               </a:rPr>
-              <a:t>expect(5 &gt; 8).</a:t>
+              <a:t>      expect(null).</a:t>
             </a:r>
             <a:r>
               <a:rPr lang="en-US" sz="2600" dirty="0" err="1">
                 <a:latin typeface="Consolas" panose="020B0609020204030204" pitchFamily="49" charset="0"/>
                 <a:cs typeface="Consolas" panose="020B0609020204030204" pitchFamily="49" charset="0"/>
               </a:rPr>
-              <a:t>to.be.false</a:t>
+              <a:t>to.be.null</a:t>
             </a:r>
             <a:r>
               <a:rPr lang="en-US" sz="2600" dirty="0">
@@ -5167,210 +5527,41 @@
             </a:r>
           </a:p>
           <a:p>
+            <a:pPr marL="0" indent="0">
+              <a:buNone/>
+            </a:pPr>
             <a:r>
               <a:rPr lang="en-US" sz="2600" dirty="0">
                 <a:latin typeface="Consolas" panose="020B0609020204030204" pitchFamily="49" charset="0"/>
                 <a:cs typeface="Consolas" panose="020B0609020204030204" pitchFamily="49" charset="0"/>
               </a:rPr>
-              <a:t>expect({}).</a:t>
+              <a:t>      expect(undefined).</a:t>
             </a:r>
             <a:r>
               <a:rPr lang="en-US" sz="2600" dirty="0" err="1">
                 <a:latin typeface="Consolas" panose="020B0609020204030204" pitchFamily="49" charset="0"/>
                 <a:cs typeface="Consolas" panose="020B0609020204030204" pitchFamily="49" charset="0"/>
               </a:rPr>
-              <a:t>to.be.a</a:t>
+              <a:t>to.not.exist</a:t>
             </a:r>
             <a:r>
               <a:rPr lang="en-US" sz="2600" dirty="0">
                 <a:latin typeface="Consolas" panose="020B0609020204030204" pitchFamily="49" charset="0"/>
                 <a:cs typeface="Consolas" panose="020B0609020204030204" pitchFamily="49" charset="0"/>
               </a:rPr>
-              <a:t>('object');</a:t>
-            </a:r>
-          </a:p>
-          <a:p>
+              <a:t>;</a:t>
+            </a:r>
+          </a:p>
+          <a:p>
+            <a:pPr marL="0" indent="0">
+              <a:buNone/>
+            </a:pPr>
             <a:r>
               <a:rPr lang="en-US" sz="2600" dirty="0">
                 <a:latin typeface="Consolas" panose="020B0609020204030204" pitchFamily="49" charset="0"/>
                 <a:cs typeface="Consolas" panose="020B0609020204030204" pitchFamily="49" charset="0"/>
               </a:rPr>
-              <a:t>expect({}).</a:t>
-            </a:r>
-            <a:r>
-              <a:rPr lang="en-US" sz="2600" dirty="0" err="1">
-                <a:latin typeface="Consolas" panose="020B0609020204030204" pitchFamily="49" charset="0"/>
-                <a:cs typeface="Consolas" panose="020B0609020204030204" pitchFamily="49" charset="0"/>
-              </a:rPr>
-              <a:t>to.be.empty</a:t>
-            </a:r>
-            <a:r>
-              <a:rPr lang="en-US" sz="2600" dirty="0">
-                <a:latin typeface="Consolas" panose="020B0609020204030204" pitchFamily="49" charset="0"/>
-                <a:cs typeface="Consolas" panose="020B0609020204030204" pitchFamily="49" charset="0"/>
-              </a:rPr>
-              <a:t>;</a:t>
-            </a:r>
-          </a:p>
-          <a:p>
-            <a:r>
-              <a:rPr lang="en-US" sz="2600" dirty="0">
-                <a:latin typeface="Consolas" panose="020B0609020204030204" pitchFamily="49" charset="0"/>
-                <a:cs typeface="Consolas" panose="020B0609020204030204" pitchFamily="49" charset="0"/>
-              </a:rPr>
-              <a:t>expect('foo').</a:t>
-            </a:r>
-            <a:r>
-              <a:rPr lang="en-US" sz="2600" dirty="0" err="1">
-                <a:latin typeface="Consolas" panose="020B0609020204030204" pitchFamily="49" charset="0"/>
-                <a:cs typeface="Consolas" panose="020B0609020204030204" pitchFamily="49" charset="0"/>
-              </a:rPr>
-              <a:t>to.be.a</a:t>
-            </a:r>
-            <a:r>
-              <a:rPr lang="en-US" sz="2600" dirty="0">
-                <a:latin typeface="Consolas" panose="020B0609020204030204" pitchFamily="49" charset="0"/>
-                <a:cs typeface="Consolas" panose="020B0609020204030204" pitchFamily="49" charset="0"/>
-              </a:rPr>
-              <a:t>('string');</a:t>
-            </a:r>
-          </a:p>
-          <a:p>
-            <a:r>
-              <a:rPr lang="en-US" sz="2600" dirty="0">
-                <a:latin typeface="Consolas" panose="020B0609020204030204" pitchFamily="49" charset="0"/>
-                <a:cs typeface="Consolas" panose="020B0609020204030204" pitchFamily="49" charset="0"/>
-              </a:rPr>
-              <a:t>expect(3).</a:t>
-            </a:r>
-            <a:r>
-              <a:rPr lang="en-US" sz="2600" dirty="0" err="1">
-                <a:latin typeface="Consolas" panose="020B0609020204030204" pitchFamily="49" charset="0"/>
-                <a:cs typeface="Consolas" panose="020B0609020204030204" pitchFamily="49" charset="0"/>
-              </a:rPr>
-              <a:t>to.be.a</a:t>
-            </a:r>
-            <a:r>
-              <a:rPr lang="en-US" sz="2600" dirty="0">
-                <a:latin typeface="Consolas" panose="020B0609020204030204" pitchFamily="49" charset="0"/>
-                <a:cs typeface="Consolas" panose="020B0609020204030204" pitchFamily="49" charset="0"/>
-              </a:rPr>
-              <a:t>('number');</a:t>
-            </a:r>
-          </a:p>
-          <a:p>
-            <a:r>
-              <a:rPr lang="en-US" sz="2600" dirty="0">
-                <a:latin typeface="Consolas" panose="020B0609020204030204" pitchFamily="49" charset="0"/>
-                <a:cs typeface="Consolas" panose="020B0609020204030204" pitchFamily="49" charset="0"/>
-              </a:rPr>
-              <a:t>expect('bar').</a:t>
-            </a:r>
-            <a:r>
-              <a:rPr lang="en-US" sz="2600" dirty="0" err="1">
-                <a:latin typeface="Consolas" panose="020B0609020204030204" pitchFamily="49" charset="0"/>
-                <a:cs typeface="Consolas" panose="020B0609020204030204" pitchFamily="49" charset="0"/>
-              </a:rPr>
-              <a:t>to.be.a</a:t>
-            </a:r>
-            <a:r>
-              <a:rPr lang="en-US" sz="2600" dirty="0">
-                <a:latin typeface="Consolas" panose="020B0609020204030204" pitchFamily="49" charset="0"/>
-                <a:cs typeface="Consolas" panose="020B0609020204030204" pitchFamily="49" charset="0"/>
-              </a:rPr>
-              <a:t>('string').</a:t>
-            </a:r>
-            <a:r>
-              <a:rPr lang="en-US" sz="2600" dirty="0" err="1">
-                <a:latin typeface="Consolas" panose="020B0609020204030204" pitchFamily="49" charset="0"/>
-                <a:cs typeface="Consolas" panose="020B0609020204030204" pitchFamily="49" charset="0"/>
-              </a:rPr>
-              <a:t>with.lengthOf</a:t>
-            </a:r>
-            <a:r>
-              <a:rPr lang="en-US" sz="2600" dirty="0">
-                <a:latin typeface="Consolas" panose="020B0609020204030204" pitchFamily="49" charset="0"/>
-                <a:cs typeface="Consolas" panose="020B0609020204030204" pitchFamily="49" charset="0"/>
-              </a:rPr>
-              <a:t>(3);</a:t>
-            </a:r>
-          </a:p>
-          <a:p>
-            <a:r>
-              <a:rPr lang="en-US" sz="2600" dirty="0">
-                <a:latin typeface="Consolas" panose="020B0609020204030204" pitchFamily="49" charset="0"/>
-                <a:cs typeface="Consolas" panose="020B0609020204030204" pitchFamily="49" charset="0"/>
-              </a:rPr>
-              <a:t>expect([1,2,3].length).</a:t>
-            </a:r>
-            <a:r>
-              <a:rPr lang="en-US" sz="2600" dirty="0" err="1">
-                <a:latin typeface="Consolas" panose="020B0609020204030204" pitchFamily="49" charset="0"/>
-                <a:cs typeface="Consolas" panose="020B0609020204030204" pitchFamily="49" charset="0"/>
-              </a:rPr>
-              <a:t>to.equal</a:t>
-            </a:r>
-            <a:r>
-              <a:rPr lang="en-US" sz="2600" dirty="0">
-                <a:latin typeface="Consolas" panose="020B0609020204030204" pitchFamily="49" charset="0"/>
-                <a:cs typeface="Consolas" panose="020B0609020204030204" pitchFamily="49" charset="0"/>
-              </a:rPr>
-              <a:t>(3);</a:t>
-            </a:r>
-          </a:p>
-          <a:p>
-            <a:r>
-              <a:rPr lang="en-US" sz="2600" dirty="0">
-                <a:latin typeface="Consolas" panose="020B0609020204030204" pitchFamily="49" charset="0"/>
-                <a:cs typeface="Consolas" panose="020B0609020204030204" pitchFamily="49" charset="0"/>
-              </a:rPr>
-              <a:t>expect(null).</a:t>
-            </a:r>
-            <a:r>
-              <a:rPr lang="en-US" sz="2600" dirty="0" err="1">
-                <a:latin typeface="Consolas" panose="020B0609020204030204" pitchFamily="49" charset="0"/>
-                <a:cs typeface="Consolas" panose="020B0609020204030204" pitchFamily="49" charset="0"/>
-              </a:rPr>
-              <a:t>to.be.null</a:t>
-            </a:r>
-            <a:r>
-              <a:rPr lang="en-US" sz="2600" dirty="0">
-                <a:latin typeface="Consolas" panose="020B0609020204030204" pitchFamily="49" charset="0"/>
-                <a:cs typeface="Consolas" panose="020B0609020204030204" pitchFamily="49" charset="0"/>
-              </a:rPr>
-              <a:t>;</a:t>
-            </a:r>
-          </a:p>
-          <a:p>
-            <a:r>
-              <a:rPr lang="en-US" sz="2600" dirty="0">
-                <a:latin typeface="Consolas" panose="020B0609020204030204" pitchFamily="49" charset="0"/>
-                <a:cs typeface="Consolas" panose="020B0609020204030204" pitchFamily="49" charset="0"/>
-              </a:rPr>
-              <a:t>expect(undefined).</a:t>
-            </a:r>
-            <a:r>
-              <a:rPr lang="en-US" sz="2600" dirty="0" err="1">
-                <a:latin typeface="Consolas" panose="020B0609020204030204" pitchFamily="49" charset="0"/>
-                <a:cs typeface="Consolas" panose="020B0609020204030204" pitchFamily="49" charset="0"/>
-              </a:rPr>
-              <a:t>to.not.exist</a:t>
-            </a:r>
-            <a:r>
-              <a:rPr lang="en-US" sz="2600" dirty="0">
-                <a:latin typeface="Consolas" panose="020B0609020204030204" pitchFamily="49" charset="0"/>
-                <a:cs typeface="Consolas" panose="020B0609020204030204" pitchFamily="49" charset="0"/>
-              </a:rPr>
-              <a:t>;</a:t>
-            </a:r>
-          </a:p>
-          <a:p>
-            <a:r>
-              <a:rPr lang="en-US" sz="2600" dirty="0">
-                <a:latin typeface="Consolas" panose="020B0609020204030204" pitchFamily="49" charset="0"/>
-                <a:cs typeface="Consolas" panose="020B0609020204030204" pitchFamily="49" charset="0"/>
-              </a:rPr>
-              <a:t>expect(1).</a:t>
+              <a:t>      expect(1).</a:t>
             </a:r>
             <a:r>
               <a:rPr lang="en-US" sz="2600" dirty="0" err="1">
@@ -5479,6 +5670,12 @@
           <a:lstStyle/>
           <a:p>
             <a:pPr marL="0" indent="0">
+              <a:lnSpc>
+                <a:spcPct val="100000"/>
+              </a:lnSpc>
+              <a:spcBef>
+                <a:spcPts val="0"/>
+              </a:spcBef>
               <a:buNone/>
             </a:pPr>
             <a:r>
@@ -5486,11 +5683,17 @@
                 <a:latin typeface="Consolas" panose="020B0609020204030204" pitchFamily="49" charset="0"/>
                 <a:cs typeface="Consolas" panose="020B0609020204030204" pitchFamily="49" charset="0"/>
               </a:rPr>
-              <a:t>var foo = 'bar'</a:t>
-            </a:r>
-          </a:p>
-          <a:p>
-            <a:pPr marL="0" indent="0">
+              <a:t>var foo = `bar`</a:t>
+            </a:r>
+          </a:p>
+          <a:p>
+            <a:pPr marL="0" indent="0">
+              <a:lnSpc>
+                <a:spcPct val="100000"/>
+              </a:lnSpc>
+              <a:spcBef>
+                <a:spcPts val="0"/>
+              </a:spcBef>
               <a:buNone/>
             </a:pPr>
             <a:r>
@@ -5498,19 +5701,44 @@
                 <a:latin typeface="Consolas" panose="020B0609020204030204" pitchFamily="49" charset="0"/>
                 <a:cs typeface="Consolas" panose="020B0609020204030204" pitchFamily="49" charset="0"/>
               </a:rPr>
-              <a:t>, cars = { brand: [ 'BMW', 'Audi', 'Bentley' ] };</a:t>
-            </a:r>
-          </a:p>
-          <a:p>
-            <a:pPr marL="0" indent="0">
-              <a:buNone/>
-            </a:pPr>
-            <a:br>
+              <a:t>, cars = { brand: [ `BMW`, `Audi`, `Bentley` ] };</a:t>
+            </a:r>
+          </a:p>
+          <a:p>
+            <a:pPr marL="0" indent="0">
+              <a:lnSpc>
+                <a:spcPct val="100000"/>
+              </a:lnSpc>
+              <a:spcBef>
+                <a:spcPts val="0"/>
+              </a:spcBef>
+              <a:buNone/>
+            </a:pPr>
+            <a:r>
+              <a:rPr lang="en-US" sz="2000" dirty="0" err="1">
+                <a:latin typeface="Consolas" panose="020B0609020204030204" pitchFamily="49" charset="0"/>
+                <a:cs typeface="Consolas" panose="020B0609020204030204" pitchFamily="49" charset="0"/>
+              </a:rPr>
+              <a:t>assert.typeOf</a:t>
+            </a:r>
+            <a:r>
               <a:rPr lang="en-US" sz="2000" dirty="0">
                 <a:latin typeface="Consolas" panose="020B0609020204030204" pitchFamily="49" charset="0"/>
                 <a:cs typeface="Consolas" panose="020B0609020204030204" pitchFamily="49" charset="0"/>
               </a:rPr>
-            </a:br>
+              <a:t>(foo, `string`); // without optional message</a:t>
+            </a:r>
+          </a:p>
+          <a:p>
+            <a:pPr marL="0" indent="0">
+              <a:lnSpc>
+                <a:spcPct val="100000"/>
+              </a:lnSpc>
+              <a:spcBef>
+                <a:spcPts val="0"/>
+              </a:spcBef>
+              <a:buNone/>
+            </a:pPr>
             <a:r>
               <a:rPr lang="en-US" sz="2000" dirty="0" err="1">
                 <a:latin typeface="Consolas" panose="020B0609020204030204" pitchFamily="49" charset="0"/>
@@ -5523,11 +5751,17 @@
                 <a:latin typeface="Consolas" panose="020B0609020204030204" pitchFamily="49" charset="0"/>
                 <a:cs typeface="Consolas" panose="020B0609020204030204" pitchFamily="49" charset="0"/>
               </a:rPr>
-              <a:t>(foo, 'string'); // without optional message</a:t>
-            </a:r>
-          </a:p>
-          <a:p>
-            <a:pPr marL="0" indent="0">
+              <a:t>(foo, `string`, `foo is a string`); // with optional message</a:t>
+            </a:r>
+          </a:p>
+          <a:p>
+            <a:pPr marL="0" indent="0">
+              <a:lnSpc>
+                <a:spcPct val="100000"/>
+              </a:lnSpc>
+              <a:spcBef>
+                <a:spcPts val="0"/>
+              </a:spcBef>
               <a:buNone/>
             </a:pPr>
             <a:r>
@@ -5535,18 +5769,24 @@
                 <a:latin typeface="Consolas" panose="020B0609020204030204" pitchFamily="49" charset="0"/>
                 <a:cs typeface="Consolas" panose="020B0609020204030204" pitchFamily="49" charset="0"/>
               </a:rPr>
-              <a:t>assert.typeOf</a:t>
+              <a:t>assert.equal</a:t>
             </a:r>
             <a:r>
               <a:rPr lang="en-US" sz="2000" dirty="0">
                 <a:latin typeface="Consolas" panose="020B0609020204030204" pitchFamily="49" charset="0"/>
                 <a:cs typeface="Consolas" panose="020B0609020204030204" pitchFamily="49" charset="0"/>
               </a:rPr>
-              <a:t>(foo, 'string', 'foo is a string'); // with optional message</a:t>
-            </a:r>
-          </a:p>
-          <a:p>
-            <a:pPr marL="0" indent="0">
+              <a:t>(foo, `bar`, `foo equal bar`);</a:t>
+            </a:r>
+          </a:p>
+          <a:p>
+            <a:pPr marL="0" indent="0">
+              <a:lnSpc>
+                <a:spcPct val="100000"/>
+              </a:lnSpc>
+              <a:spcBef>
+                <a:spcPts val="0"/>
+              </a:spcBef>
               <a:buNone/>
             </a:pPr>
             <a:r>
@@ -5554,18 +5794,24 @@
                 <a:latin typeface="Consolas" panose="020B0609020204030204" pitchFamily="49" charset="0"/>
                 <a:cs typeface="Consolas" panose="020B0609020204030204" pitchFamily="49" charset="0"/>
               </a:rPr>
-              <a:t>assert.equal</a:t>
+              <a:t>assert.lengthOf</a:t>
             </a:r>
             <a:r>
               <a:rPr lang="en-US" sz="2000" dirty="0">
                 <a:latin typeface="Consolas" panose="020B0609020204030204" pitchFamily="49" charset="0"/>
                 <a:cs typeface="Consolas" panose="020B0609020204030204" pitchFamily="49" charset="0"/>
               </a:rPr>
-              <a:t>(foo, 'bar', 'foo equal `bar`');</a:t>
-            </a:r>
-          </a:p>
-          <a:p>
-            <a:pPr marL="0" indent="0">
+              <a:t>(foo, 3, `foo value has a length of 3`);</a:t>
+            </a:r>
+          </a:p>
+          <a:p>
+            <a:pPr marL="0" indent="0">
+              <a:lnSpc>
+                <a:spcPct val="100000"/>
+              </a:lnSpc>
+              <a:spcBef>
+                <a:spcPts val="0"/>
+              </a:spcBef>
               <a:buNone/>
             </a:pPr>
             <a:r>
@@ -5580,40 +5826,21 @@
                 <a:latin typeface="Consolas" panose="020B0609020204030204" pitchFamily="49" charset="0"/>
                 <a:cs typeface="Consolas" panose="020B0609020204030204" pitchFamily="49" charset="0"/>
               </a:rPr>
-              <a:t>(foo, 3, 'foo`s value has a length of 3');</a:t>
-            </a:r>
-          </a:p>
-          <a:p>
-            <a:pPr marL="0" indent="0">
-              <a:buNone/>
-            </a:pPr>
+              <a:t>(</a:t>
+            </a:r>
             <a:r>
               <a:rPr lang="en-US" sz="2000" dirty="0" err="1">
                 <a:latin typeface="Consolas" panose="020B0609020204030204" pitchFamily="49" charset="0"/>
                 <a:cs typeface="Consolas" panose="020B0609020204030204" pitchFamily="49" charset="0"/>
               </a:rPr>
-              <a:t>assert.lengthOf</a:t>
+              <a:t>cars.brand</a:t>
             </a:r>
             <a:r>
               <a:rPr lang="en-US" sz="2000" dirty="0">
                 <a:latin typeface="Consolas" panose="020B0609020204030204" pitchFamily="49" charset="0"/>
                 <a:cs typeface="Consolas" panose="020B0609020204030204" pitchFamily="49" charset="0"/>
               </a:rPr>
-              <a:t>(</a:t>
-            </a:r>
-            <a:r>
-              <a:rPr lang="en-US" sz="2000" dirty="0" err="1">
-                <a:latin typeface="Consolas" panose="020B0609020204030204" pitchFamily="49" charset="0"/>
-                <a:cs typeface="Consolas" panose="020B0609020204030204" pitchFamily="49" charset="0"/>
-              </a:rPr>
-              <a:t>cars.brand</a:t>
-            </a:r>
-            <a:r>
-              <a:rPr lang="en-US" sz="2000" dirty="0">
-                <a:latin typeface="Consolas" panose="020B0609020204030204" pitchFamily="49" charset="0"/>
-                <a:cs typeface="Consolas" panose="020B0609020204030204" pitchFamily="49" charset="0"/>
-              </a:rPr>
-              <a:t>, 3, 'cars has 3 types of brand');</a:t>
+              <a:t>, 3, `cars has 3 types of brand`);</a:t>
             </a:r>
           </a:p>
           <a:p>
@@ -5739,8 +5966,8 @@
         </p:nvSpPr>
         <p:spPr>
           <a:xfrm>
-            <a:off x="838200" y="2289133"/>
-            <a:ext cx="5257800" cy="4568867"/>
+            <a:off x="287054" y="2289133"/>
+            <a:ext cx="5650281" cy="4568867"/>
           </a:xfrm>
           <a:prstGeom prst="rect">
             <a:avLst/>
@@ -5748,7 +5975,7 @@
         </p:spPr>
         <p:txBody>
           <a:bodyPr vert="horz" lIns="91440" tIns="45720" rIns="91440" bIns="45720" rtlCol="0">
-            <a:normAutofit/>
+            <a:normAutofit fontScale="77500" lnSpcReduction="20000"/>
           </a:bodyPr>
           <a:lstStyle>
             <a:lvl1pPr marL="228600" indent="-228600" algn="l" defTabSz="914400" rtl="0" eaLnBrk="1" latinLnBrk="0" hangingPunct="1">
@@ -5917,21 +6144,15 @@
           <a:p>
             <a:r>
               <a:rPr lang="en-CO" dirty="0"/>
-              <a:t>Class to be tested: readfile.js</a:t>
-            </a:r>
-          </a:p>
-          <a:p>
-            <a:pPr marL="0" indent="0">
-              <a:lnSpc>
-                <a:spcPct val="120000"/>
-              </a:lnSpc>
-              <a:spcBef>
-                <a:spcPts val="0"/>
-              </a:spcBef>
-              <a:buNone/>
-            </a:pPr>
-            <a:r>
-              <a:rPr lang="en-US" sz="1400" dirty="0">
+              <a:t>Class to be tested: RF.js</a:t>
+            </a:r>
+          </a:p>
+          <a:p>
+            <a:pPr marL="0" indent="0">
+              <a:buNone/>
+            </a:pPr>
+            <a:r>
+              <a:rPr lang="en-US" sz="2000" dirty="0">
                 <a:latin typeface="Consolas" panose="020B0609020204030204" pitchFamily="49" charset="0"/>
                 <a:cs typeface="Consolas" panose="020B0609020204030204" pitchFamily="49" charset="0"/>
               </a:rPr>
@@ -5940,50 +6161,38 @@
           </a:p>
           <a:p>
             <a:pPr marL="0" indent="0">
-              <a:lnSpc>
-                <a:spcPct val="120000"/>
-              </a:lnSpc>
-              <a:spcBef>
-                <a:spcPts val="0"/>
-              </a:spcBef>
-              <a:buNone/>
-            </a:pPr>
-            <a:br>
-              <a:rPr lang="en-US" sz="1400" dirty="0">
-                <a:latin typeface="Consolas" panose="020B0609020204030204" pitchFamily="49" charset="0"/>
-                <a:cs typeface="Consolas" panose="020B0609020204030204" pitchFamily="49" charset="0"/>
-              </a:rPr>
-            </a:br>
-            <a:r>
-              <a:rPr lang="en-US" sz="1400" dirty="0">
+              <a:buNone/>
+            </a:pPr>
+            <a:r>
+              <a:rPr lang="en-US" sz="2000" dirty="0">
                 <a:latin typeface="Consolas" panose="020B0609020204030204" pitchFamily="49" charset="0"/>
                 <a:cs typeface="Consolas" panose="020B0609020204030204" pitchFamily="49" charset="0"/>
               </a:rPr>
               <a:t>function </a:t>
             </a:r>
             <a:r>
-              <a:rPr lang="en-US" sz="1400" dirty="0" err="1">
+              <a:rPr lang="en-US" sz="2000" dirty="0" err="1">
                 <a:latin typeface="Consolas" panose="020B0609020204030204" pitchFamily="49" charset="0"/>
                 <a:cs typeface="Consolas" panose="020B0609020204030204" pitchFamily="49" charset="0"/>
               </a:rPr>
               <a:t>readSomethingFromFileSystem</a:t>
             </a:r>
             <a:r>
-              <a:rPr lang="en-US" sz="1400" dirty="0">
+              <a:rPr lang="en-US" sz="2000" dirty="0">
                 <a:latin typeface="Consolas" panose="020B0609020204030204" pitchFamily="49" charset="0"/>
                 <a:cs typeface="Consolas" panose="020B0609020204030204" pitchFamily="49" charset="0"/>
               </a:rPr>
               <a:t>(</a:t>
             </a:r>
             <a:r>
-              <a:rPr lang="en-US" sz="1400" dirty="0" err="1">
+              <a:rPr lang="en-US" sz="2000" dirty="0" err="1">
                 <a:latin typeface="Consolas" panose="020B0609020204030204" pitchFamily="49" charset="0"/>
                 <a:cs typeface="Consolas" panose="020B0609020204030204" pitchFamily="49" charset="0"/>
               </a:rPr>
               <a:t>cb</a:t>
             </a:r>
             <a:r>
-              <a:rPr lang="en-US" sz="1400" dirty="0">
+              <a:rPr lang="en-US" sz="2000" dirty="0">
                 <a:latin typeface="Consolas" panose="020B0609020204030204" pitchFamily="49" charset="0"/>
                 <a:cs typeface="Consolas" panose="020B0609020204030204" pitchFamily="49" charset="0"/>
               </a:rPr>
@@ -5992,76 +6201,64 @@
           </a:p>
           <a:p>
             <a:pPr marL="0" indent="0">
-              <a:lnSpc>
-                <a:spcPct val="120000"/>
-              </a:lnSpc>
-              <a:spcBef>
-                <a:spcPts val="0"/>
-              </a:spcBef>
-              <a:buNone/>
-            </a:pPr>
-            <a:r>
-              <a:rPr lang="en-US" sz="1400" dirty="0">
+              <a:buNone/>
+            </a:pPr>
+            <a:r>
+              <a:rPr lang="en-US" sz="2000" dirty="0">
                 <a:latin typeface="Consolas" panose="020B0609020204030204" pitchFamily="49" charset="0"/>
                 <a:cs typeface="Consolas" panose="020B0609020204030204" pitchFamily="49" charset="0"/>
               </a:rPr>
               <a:t>  </a:t>
             </a:r>
             <a:r>
-              <a:rPr lang="en-US" sz="1400" dirty="0" err="1">
+              <a:rPr lang="en-US" sz="2000" dirty="0" err="1">
                 <a:latin typeface="Consolas" panose="020B0609020204030204" pitchFamily="49" charset="0"/>
                 <a:cs typeface="Consolas" panose="020B0609020204030204" pitchFamily="49" charset="0"/>
               </a:rPr>
               <a:t>console.log</a:t>
             </a:r>
             <a:r>
-              <a:rPr lang="en-US" sz="1400" dirty="0">
-                <a:latin typeface="Consolas" panose="020B0609020204030204" pitchFamily="49" charset="0"/>
-                <a:cs typeface="Consolas" panose="020B0609020204030204" pitchFamily="49" charset="0"/>
-              </a:rPr>
-              <a:t>("Reading from file system ...");</a:t>
-            </a:r>
-          </a:p>
-          <a:p>
-            <a:pPr marL="0" indent="0">
-              <a:lnSpc>
-                <a:spcPct val="120000"/>
-              </a:lnSpc>
-              <a:spcBef>
-                <a:spcPts val="0"/>
-              </a:spcBef>
-              <a:buNone/>
-            </a:pPr>
-            <a:r>
-              <a:rPr lang="en-US" sz="1400" dirty="0">
+              <a:rPr lang="en-US" sz="2000" dirty="0">
+                <a:latin typeface="Consolas" panose="020B0609020204030204" pitchFamily="49" charset="0"/>
+                <a:cs typeface="Consolas" panose="020B0609020204030204" pitchFamily="49" charset="0"/>
+              </a:rPr>
+              <a:t>("Reading from file system ...")</a:t>
+            </a:r>
+          </a:p>
+          <a:p>
+            <a:pPr marL="0" indent="0">
+              <a:buNone/>
+            </a:pPr>
+            <a:r>
+              <a:rPr lang="en-US" sz="2000" dirty="0">
                 <a:latin typeface="Consolas" panose="020B0609020204030204" pitchFamily="49" charset="0"/>
                 <a:cs typeface="Consolas" panose="020B0609020204030204" pitchFamily="49" charset="0"/>
               </a:rPr>
               <a:t>  </a:t>
             </a:r>
             <a:r>
-              <a:rPr lang="en-US" sz="1400" dirty="0" err="1">
+              <a:rPr lang="en-US" sz="2000" dirty="0" err="1">
                 <a:latin typeface="Consolas" panose="020B0609020204030204" pitchFamily="49" charset="0"/>
                 <a:cs typeface="Consolas" panose="020B0609020204030204" pitchFamily="49" charset="0"/>
               </a:rPr>
               <a:t>noIdea</a:t>
             </a:r>
             <a:r>
-              <a:rPr lang="en-US" sz="1400" dirty="0">
+              <a:rPr lang="en-US" sz="2000" dirty="0">
                 <a:latin typeface="Consolas" panose="020B0609020204030204" pitchFamily="49" charset="0"/>
                 <a:cs typeface="Consolas" panose="020B0609020204030204" pitchFamily="49" charset="0"/>
               </a:rPr>
               <a:t>(</a:t>
             </a:r>
             <a:r>
-              <a:rPr lang="en-US" sz="1400" dirty="0" err="1">
+              <a:rPr lang="en-US" sz="2000" dirty="0" err="1">
                 <a:latin typeface="Consolas" panose="020B0609020204030204" pitchFamily="49" charset="0"/>
                 <a:cs typeface="Consolas" panose="020B0609020204030204" pitchFamily="49" charset="0"/>
               </a:rPr>
               <a:t>cb</a:t>
             </a:r>
             <a:r>
-              <a:rPr lang="en-US" sz="1400" dirty="0">
+              <a:rPr lang="en-US" sz="2000" dirty="0">
                 <a:latin typeface="Consolas" panose="020B0609020204030204" pitchFamily="49" charset="0"/>
                 <a:cs typeface="Consolas" panose="020B0609020204030204" pitchFamily="49" charset="0"/>
               </a:rPr>
@@ -6070,16 +6267,10 @@
           </a:p>
           <a:p>
             <a:pPr marL="0" indent="0">
-              <a:lnSpc>
-                <a:spcPct val="120000"/>
-              </a:lnSpc>
-              <a:spcBef>
-                <a:spcPts val="0"/>
-              </a:spcBef>
-              <a:buNone/>
-            </a:pPr>
-            <a:r>
-              <a:rPr lang="en-US" sz="1400" dirty="0">
+              <a:buNone/>
+            </a:pPr>
+            <a:r>
+              <a:rPr lang="en-US" sz="2000" dirty="0">
                 <a:latin typeface="Consolas" panose="020B0609020204030204" pitchFamily="49" charset="0"/>
                 <a:cs typeface="Consolas" panose="020B0609020204030204" pitchFamily="49" charset="0"/>
               </a:rPr>
@@ -6088,50 +6279,38 @@
           </a:p>
           <a:p>
             <a:pPr marL="0" indent="0">
-              <a:lnSpc>
-                <a:spcPct val="120000"/>
-              </a:lnSpc>
-              <a:spcBef>
-                <a:spcPts val="0"/>
-              </a:spcBef>
-              <a:buNone/>
-            </a:pPr>
-            <a:br>
-              <a:rPr lang="en-US" sz="1400" dirty="0">
-                <a:latin typeface="Consolas" panose="020B0609020204030204" pitchFamily="49" charset="0"/>
-                <a:cs typeface="Consolas" panose="020B0609020204030204" pitchFamily="49" charset="0"/>
-              </a:rPr>
-            </a:br>
-            <a:r>
-              <a:rPr lang="en-US" sz="1400" dirty="0">
+              <a:buNone/>
+            </a:pPr>
+            <a:r>
+              <a:rPr lang="en-US" sz="2000" dirty="0">
                 <a:latin typeface="Consolas" panose="020B0609020204030204" pitchFamily="49" charset="0"/>
                 <a:cs typeface="Consolas" panose="020B0609020204030204" pitchFamily="49" charset="0"/>
               </a:rPr>
               <a:t>function </a:t>
             </a:r>
             <a:r>
-              <a:rPr lang="en-US" sz="1400" dirty="0" err="1">
+              <a:rPr lang="en-US" sz="2000" dirty="0" err="1">
                 <a:latin typeface="Consolas" panose="020B0609020204030204" pitchFamily="49" charset="0"/>
                 <a:cs typeface="Consolas" panose="020B0609020204030204" pitchFamily="49" charset="0"/>
               </a:rPr>
               <a:t>noIdea</a:t>
             </a:r>
             <a:r>
-              <a:rPr lang="en-US" sz="1400" dirty="0">
+              <a:rPr lang="en-US" sz="2000" dirty="0">
                 <a:latin typeface="Consolas" panose="020B0609020204030204" pitchFamily="49" charset="0"/>
                 <a:cs typeface="Consolas" panose="020B0609020204030204" pitchFamily="49" charset="0"/>
               </a:rPr>
               <a:t>(</a:t>
             </a:r>
             <a:r>
-              <a:rPr lang="en-US" sz="1400" dirty="0" err="1">
+              <a:rPr lang="en-US" sz="2000" dirty="0" err="1">
                 <a:latin typeface="Consolas" panose="020B0609020204030204" pitchFamily="49" charset="0"/>
                 <a:cs typeface="Consolas" panose="020B0609020204030204" pitchFamily="49" charset="0"/>
               </a:rPr>
               <a:t>cb</a:t>
             </a:r>
             <a:r>
-              <a:rPr lang="en-US" sz="1400" dirty="0">
+              <a:rPr lang="en-US" sz="2000" dirty="0">
                 <a:latin typeface="Consolas" panose="020B0609020204030204" pitchFamily="49" charset="0"/>
                 <a:cs typeface="Consolas" panose="020B0609020204030204" pitchFamily="49" charset="0"/>
               </a:rPr>
@@ -6140,108 +6319,90 @@
           </a:p>
           <a:p>
             <a:pPr marL="0" indent="0">
-              <a:lnSpc>
-                <a:spcPct val="120000"/>
-              </a:lnSpc>
-              <a:spcBef>
-                <a:spcPts val="0"/>
-              </a:spcBef>
-              <a:buNone/>
-            </a:pPr>
-            <a:r>
-              <a:rPr lang="en-US" sz="1400" dirty="0">
+              <a:buNone/>
+            </a:pPr>
+            <a:r>
+              <a:rPr lang="en-US" sz="2000" dirty="0">
                 <a:latin typeface="Consolas" panose="020B0609020204030204" pitchFamily="49" charset="0"/>
                 <a:cs typeface="Consolas" panose="020B0609020204030204" pitchFamily="49" charset="0"/>
               </a:rPr>
               <a:t>  </a:t>
             </a:r>
             <a:r>
-              <a:rPr lang="en-US" sz="1400" dirty="0" err="1">
+              <a:rPr lang="en-US" sz="2000" dirty="0" err="1">
                 <a:latin typeface="Consolas" panose="020B0609020204030204" pitchFamily="49" charset="0"/>
                 <a:cs typeface="Consolas" panose="020B0609020204030204" pitchFamily="49" charset="0"/>
               </a:rPr>
               <a:t>cb</a:t>
             </a:r>
             <a:r>
-              <a:rPr lang="en-US" sz="1400" dirty="0">
+              <a:rPr lang="en-US" sz="2000" dirty="0">
                 <a:latin typeface="Consolas" panose="020B0609020204030204" pitchFamily="49" charset="0"/>
                 <a:cs typeface="Consolas" panose="020B0609020204030204" pitchFamily="49" charset="0"/>
               </a:rPr>
               <a:t>(null, "</a:t>
             </a:r>
             <a:r>
-              <a:rPr lang="en-US" sz="1400" dirty="0" err="1">
+              <a:rPr lang="en-US" sz="2000" dirty="0" err="1">
                 <a:latin typeface="Consolas" panose="020B0609020204030204" pitchFamily="49" charset="0"/>
                 <a:cs typeface="Consolas" panose="020B0609020204030204" pitchFamily="49" charset="0"/>
               </a:rPr>
               <a:t>SuccessIdea</a:t>
             </a:r>
             <a:r>
-              <a:rPr lang="en-US" sz="1400" dirty="0">
-                <a:latin typeface="Consolas" panose="020B0609020204030204" pitchFamily="49" charset="0"/>
-                <a:cs typeface="Consolas" panose="020B0609020204030204" pitchFamily="49" charset="0"/>
-              </a:rPr>
-              <a:t>!");</a:t>
-            </a:r>
-          </a:p>
-          <a:p>
-            <a:pPr marL="0" indent="0">
-              <a:lnSpc>
-                <a:spcPct val="120000"/>
-              </a:lnSpc>
-              <a:spcBef>
-                <a:spcPts val="0"/>
-              </a:spcBef>
-              <a:buNone/>
-            </a:pPr>
-            <a:r>
-              <a:rPr lang="en-US" sz="1400" dirty="0">
+              <a:rPr lang="en-US" sz="2000" dirty="0">
+                <a:latin typeface="Consolas" panose="020B0609020204030204" pitchFamily="49" charset="0"/>
+                <a:cs typeface="Consolas" panose="020B0609020204030204" pitchFamily="49" charset="0"/>
+              </a:rPr>
+              <a:t>!")</a:t>
+            </a:r>
+          </a:p>
+          <a:p>
+            <a:pPr marL="0" indent="0">
+              <a:buNone/>
+            </a:pPr>
+            <a:r>
+              <a:rPr lang="en-US" sz="2000" dirty="0">
                 <a:latin typeface="Consolas" panose="020B0609020204030204" pitchFamily="49" charset="0"/>
                 <a:cs typeface="Consolas" panose="020B0609020204030204" pitchFamily="49" charset="0"/>
               </a:rPr>
               <a:t>  </a:t>
             </a:r>
             <a:r>
-              <a:rPr lang="en-US" sz="1400" dirty="0" err="1">
+              <a:rPr lang="en-US" sz="2000" dirty="0" err="1">
                 <a:latin typeface="Consolas" panose="020B0609020204030204" pitchFamily="49" charset="0"/>
                 <a:cs typeface="Consolas" panose="020B0609020204030204" pitchFamily="49" charset="0"/>
               </a:rPr>
               <a:t>console.log</a:t>
             </a:r>
             <a:r>
-              <a:rPr lang="en-US" sz="1400" dirty="0">
-                <a:latin typeface="Consolas" panose="020B0609020204030204" pitchFamily="49" charset="0"/>
-                <a:cs typeface="Consolas" panose="020B0609020204030204" pitchFamily="49" charset="0"/>
-              </a:rPr>
-              <a:t>("Original </a:t>
-            </a:r>
-            <a:r>
-              <a:rPr lang="en-US" sz="1400" dirty="0" err="1">
+              <a:rPr lang="en-US" sz="2000" dirty="0">
+                <a:latin typeface="Consolas" panose="020B0609020204030204" pitchFamily="49" charset="0"/>
+                <a:cs typeface="Consolas" panose="020B0609020204030204" pitchFamily="49" charset="0"/>
+              </a:rPr>
+              <a:t>(`RF </a:t>
+            </a:r>
+            <a:r>
+              <a:rPr lang="en-US" sz="2000" dirty="0" err="1">
                 <a:latin typeface="Consolas" panose="020B0609020204030204" pitchFamily="49" charset="0"/>
                 <a:cs typeface="Consolas" panose="020B0609020204030204" pitchFamily="49" charset="0"/>
               </a:rPr>
               <a:t>noIdea</a:t>
             </a:r>
             <a:r>
-              <a:rPr lang="en-US" sz="1400" dirty="0">
-                <a:latin typeface="Consolas" panose="020B0609020204030204" pitchFamily="49" charset="0"/>
-                <a:cs typeface="Consolas" panose="020B0609020204030204" pitchFamily="49" charset="0"/>
-              </a:rPr>
-              <a:t> ...");</a:t>
-            </a:r>
-          </a:p>
-          <a:p>
-            <a:pPr marL="0" indent="0">
-              <a:lnSpc>
-                <a:spcPct val="120000"/>
-              </a:lnSpc>
-              <a:spcBef>
-                <a:spcPts val="0"/>
-              </a:spcBef>
-              <a:buNone/>
-            </a:pPr>
-            <a:r>
-              <a:rPr lang="en-US" sz="1400" dirty="0">
+              <a:rPr lang="en-US" sz="2000" dirty="0">
+                <a:latin typeface="Consolas" panose="020B0609020204030204" pitchFamily="49" charset="0"/>
+                <a:cs typeface="Consolas" panose="020B0609020204030204" pitchFamily="49" charset="0"/>
+              </a:rPr>
+              <a:t> path ${path}`)</a:t>
+            </a:r>
+          </a:p>
+          <a:p>
+            <a:pPr marL="0" indent="0">
+              <a:buNone/>
+            </a:pPr>
+            <a:r>
+              <a:rPr lang="en-US" sz="2000" dirty="0">
                 <a:latin typeface="Consolas" panose="020B0609020204030204" pitchFamily="49" charset="0"/>
                 <a:cs typeface="Consolas" panose="020B0609020204030204" pitchFamily="49" charset="0"/>
               </a:rPr>
@@ -6250,47 +6411,92 @@
           </a:p>
           <a:p>
             <a:pPr marL="0" indent="0">
-              <a:lnSpc>
-                <a:spcPct val="120000"/>
-              </a:lnSpc>
-              <a:spcBef>
-                <a:spcPts val="0"/>
-              </a:spcBef>
-              <a:buNone/>
-            </a:pPr>
-            <a:br>
-              <a:rPr lang="en-US" sz="1400" dirty="0">
-                <a:latin typeface="Consolas" panose="020B0609020204030204" pitchFamily="49" charset="0"/>
-                <a:cs typeface="Consolas" panose="020B0609020204030204" pitchFamily="49" charset="0"/>
-              </a:rPr>
-            </a:br>
-            <a:r>
-              <a:rPr lang="en-US" sz="1400" dirty="0" err="1">
+              <a:buNone/>
+            </a:pPr>
+            <a:r>
+              <a:rPr lang="en-US" sz="2000" dirty="0" err="1">
+                <a:latin typeface="Consolas" panose="020B0609020204030204" pitchFamily="49" charset="0"/>
+                <a:cs typeface="Consolas" panose="020B0609020204030204" pitchFamily="49" charset="0"/>
+              </a:rPr>
+              <a:t>readSomethingFromFileSystem</a:t>
+            </a:r>
+            <a:r>
+              <a:rPr lang="en-US" sz="2000" dirty="0">
+                <a:latin typeface="Consolas" panose="020B0609020204030204" pitchFamily="49" charset="0"/>
+                <a:cs typeface="Consolas" panose="020B0609020204030204" pitchFamily="49" charset="0"/>
+              </a:rPr>
+              <a:t>(function (err, data) {</a:t>
+            </a:r>
+          </a:p>
+          <a:p>
+            <a:pPr marL="0" indent="0">
+              <a:buNone/>
+            </a:pPr>
+            <a:r>
+              <a:rPr lang="en-US" sz="2000" dirty="0">
+                <a:latin typeface="Consolas" panose="020B0609020204030204" pitchFamily="49" charset="0"/>
+                <a:cs typeface="Consolas" panose="020B0609020204030204" pitchFamily="49" charset="0"/>
+              </a:rPr>
+              <a:t>  </a:t>
+            </a:r>
+            <a:r>
+              <a:rPr lang="en-US" sz="2000" dirty="0" err="1">
+                <a:latin typeface="Consolas" panose="020B0609020204030204" pitchFamily="49" charset="0"/>
+                <a:cs typeface="Consolas" panose="020B0609020204030204" pitchFamily="49" charset="0"/>
+              </a:rPr>
+              <a:t>console.log</a:t>
+            </a:r>
+            <a:r>
+              <a:rPr lang="en-US" sz="2000" dirty="0">
+                <a:latin typeface="Consolas" panose="020B0609020204030204" pitchFamily="49" charset="0"/>
+                <a:cs typeface="Consolas" panose="020B0609020204030204" pitchFamily="49" charset="0"/>
+              </a:rPr>
+              <a:t>(data); // = Success!</a:t>
+            </a:r>
+          </a:p>
+          <a:p>
+            <a:pPr marL="0" indent="0">
+              <a:buNone/>
+            </a:pPr>
+            <a:r>
+              <a:rPr lang="en-US" sz="2000" dirty="0">
+                <a:latin typeface="Consolas" panose="020B0609020204030204" pitchFamily="49" charset="0"/>
+                <a:cs typeface="Consolas" panose="020B0609020204030204" pitchFamily="49" charset="0"/>
+              </a:rPr>
+              <a:t>})</a:t>
+            </a:r>
+          </a:p>
+          <a:p>
+            <a:pPr marL="0" indent="0">
+              <a:buNone/>
+            </a:pPr>
+            <a:r>
+              <a:rPr lang="en-US" sz="2000" dirty="0" err="1">
                 <a:latin typeface="Consolas" panose="020B0609020204030204" pitchFamily="49" charset="0"/>
                 <a:cs typeface="Consolas" panose="020B0609020204030204" pitchFamily="49" charset="0"/>
               </a:rPr>
               <a:t>module.exports</a:t>
             </a:r>
             <a:r>
-              <a:rPr lang="en-US" sz="1400" dirty="0">
+              <a:rPr lang="en-US" sz="2000" dirty="0">
                 <a:latin typeface="Consolas" panose="020B0609020204030204" pitchFamily="49" charset="0"/>
                 <a:cs typeface="Consolas" panose="020B0609020204030204" pitchFamily="49" charset="0"/>
               </a:rPr>
               <a:t> = { </a:t>
             </a:r>
             <a:r>
-              <a:rPr lang="en-US" sz="1400" dirty="0" err="1">
+              <a:rPr lang="en-US" sz="2000" dirty="0" err="1">
                 <a:latin typeface="Consolas" panose="020B0609020204030204" pitchFamily="49" charset="0"/>
                 <a:cs typeface="Consolas" panose="020B0609020204030204" pitchFamily="49" charset="0"/>
               </a:rPr>
               <a:t>readSomethingFromFileSystem</a:t>
             </a:r>
             <a:r>
-              <a:rPr lang="en-US" sz="1400" dirty="0">
-                <a:latin typeface="Consolas" panose="020B0609020204030204" pitchFamily="49" charset="0"/>
-                <a:cs typeface="Consolas" panose="020B0609020204030204" pitchFamily="49" charset="0"/>
-              </a:rPr>
-              <a:t> };</a:t>
+              <a:rPr lang="en-US" sz="2000" dirty="0">
+                <a:latin typeface="Consolas" panose="020B0609020204030204" pitchFamily="49" charset="0"/>
+                <a:cs typeface="Consolas" panose="020B0609020204030204" pitchFamily="49" charset="0"/>
+              </a:rPr>
+              <a:t> }</a:t>
             </a:r>
           </a:p>
           <a:p>
@@ -6317,8 +6523,8 @@
         </p:nvSpPr>
         <p:spPr>
           <a:xfrm>
-            <a:off x="6096000" y="2289132"/>
-            <a:ext cx="5257800" cy="4568867"/>
+            <a:off x="5937336" y="2289132"/>
+            <a:ext cx="6112702" cy="4568867"/>
           </a:xfrm>
           <a:prstGeom prst="rect">
             <a:avLst/>
@@ -6495,534 +6701,181 @@
           <a:p>
             <a:r>
               <a:rPr lang="en-CO" sz="5900" dirty="0"/>
-              <a:t>Tester class</a:t>
-            </a:r>
-          </a:p>
-          <a:p>
-            <a:pPr marL="0" indent="0">
-              <a:lnSpc>
-                <a:spcPct val="120000"/>
-              </a:lnSpc>
-              <a:spcBef>
-                <a:spcPts val="0"/>
-              </a:spcBef>
-              <a:buNone/>
-            </a:pPr>
-            <a:r>
-              <a:rPr lang="en-US" dirty="0">
-                <a:latin typeface="Consolas" panose="020B0609020204030204" pitchFamily="49" charset="0"/>
-                <a:cs typeface="Consolas" panose="020B0609020204030204" pitchFamily="49" charset="0"/>
-              </a:rPr>
+              <a:t>Tester class: testRF.js</a:t>
+            </a:r>
+          </a:p>
+          <a:p>
+            <a:pPr marL="0" indent="0">
+              <a:buNone/>
+            </a:pPr>
+            <a:r>
+              <a:rPr lang="en-US" dirty="0"/>
               <a:t>const { assert, expect } = require("chai");</a:t>
             </a:r>
           </a:p>
           <a:p>
             <a:pPr marL="0" indent="0">
-              <a:lnSpc>
-                <a:spcPct val="120000"/>
-              </a:lnSpc>
-              <a:spcBef>
-                <a:spcPts val="0"/>
-              </a:spcBef>
-              <a:buNone/>
-            </a:pPr>
-            <a:r>
-              <a:rPr lang="en-US" dirty="0">
-                <a:latin typeface="Consolas" panose="020B0609020204030204" pitchFamily="49" charset="0"/>
-                <a:cs typeface="Consolas" panose="020B0609020204030204" pitchFamily="49" charset="0"/>
-              </a:rPr>
+              <a:buNone/>
+            </a:pPr>
+            <a:r>
+              <a:rPr lang="en-US" dirty="0"/>
               <a:t>describe('rewire test', () =&gt; {</a:t>
             </a:r>
           </a:p>
           <a:p>
             <a:pPr marL="0" indent="0">
-              <a:lnSpc>
-                <a:spcPct val="120000"/>
-              </a:lnSpc>
-              <a:spcBef>
-                <a:spcPts val="0"/>
-              </a:spcBef>
-              <a:buNone/>
-            </a:pPr>
-            <a:r>
-              <a:rPr lang="en-US" dirty="0">
-                <a:latin typeface="Consolas" panose="020B0609020204030204" pitchFamily="49" charset="0"/>
-                <a:cs typeface="Consolas" panose="020B0609020204030204" pitchFamily="49" charset="0"/>
-              </a:rPr>
+              <a:buNone/>
+            </a:pPr>
+            <a:r>
+              <a:rPr lang="en-US" dirty="0"/>
               <a:t>  context('test with FS', () =&gt; {</a:t>
             </a:r>
           </a:p>
           <a:p>
             <a:pPr marL="0" indent="0">
-              <a:lnSpc>
-                <a:spcPct val="120000"/>
-              </a:lnSpc>
-              <a:spcBef>
-                <a:spcPts val="0"/>
-              </a:spcBef>
-              <a:buNone/>
-            </a:pPr>
-            <a:r>
-              <a:rPr lang="en-US" dirty="0">
-                <a:latin typeface="Consolas" panose="020B0609020204030204" pitchFamily="49" charset="0"/>
-                <a:cs typeface="Consolas" panose="020B0609020204030204" pitchFamily="49" charset="0"/>
-              </a:rPr>
+              <a:buNone/>
+            </a:pPr>
+            <a:r>
+              <a:rPr lang="en-US" dirty="0"/>
               <a:t>    it('test </a:t>
             </a:r>
             <a:r>
-              <a:rPr lang="en-US" dirty="0" err="1">
-                <a:latin typeface="Consolas" panose="020B0609020204030204" pitchFamily="49" charset="0"/>
-                <a:cs typeface="Consolas" panose="020B0609020204030204" pitchFamily="49" charset="0"/>
-              </a:rPr>
+              <a:rPr lang="en-US" dirty="0" err="1"/>
               <a:t>readfile</a:t>
             </a:r>
             <a:r>
-              <a:rPr lang="en-US" dirty="0">
-                <a:latin typeface="Consolas" panose="020B0609020204030204" pitchFamily="49" charset="0"/>
-                <a:cs typeface="Consolas" panose="020B0609020204030204" pitchFamily="49" charset="0"/>
-              </a:rPr>
+              <a:rPr lang="en-US" dirty="0"/>
               <a:t>', () =&gt; {</a:t>
             </a:r>
           </a:p>
           <a:p>
             <a:pPr marL="0" indent="0">
-              <a:lnSpc>
-                <a:spcPct val="120000"/>
-              </a:lnSpc>
-              <a:spcBef>
-                <a:spcPts val="0"/>
-              </a:spcBef>
-              <a:buNone/>
-            </a:pPr>
-            <a:r>
-              <a:rPr lang="en-US" dirty="0">
-                <a:latin typeface="Consolas" panose="020B0609020204030204" pitchFamily="49" charset="0"/>
-                <a:cs typeface="Consolas" panose="020B0609020204030204" pitchFamily="49" charset="0"/>
-              </a:rPr>
+              <a:buNone/>
+            </a:pPr>
+            <a:r>
+              <a:rPr lang="en-US" dirty="0"/>
               <a:t>      var rewire = require("rewire");</a:t>
             </a:r>
           </a:p>
           <a:p>
             <a:pPr marL="0" indent="0">
-              <a:lnSpc>
-                <a:spcPct val="120000"/>
-              </a:lnSpc>
-              <a:spcBef>
-                <a:spcPts val="0"/>
-              </a:spcBef>
-              <a:buNone/>
-            </a:pPr>
-            <a:r>
-              <a:rPr lang="en-US" dirty="0">
-                <a:latin typeface="Consolas" panose="020B0609020204030204" pitchFamily="49" charset="0"/>
-                <a:cs typeface="Consolas" panose="020B0609020204030204" pitchFamily="49" charset="0"/>
-              </a:rPr>
+              <a:buNone/>
+            </a:pPr>
+            <a:r>
+              <a:rPr lang="en-US" dirty="0"/>
               <a:t>      var </a:t>
             </a:r>
             <a:r>
-              <a:rPr lang="en-US" dirty="0" err="1">
-                <a:latin typeface="Consolas" panose="020B0609020204030204" pitchFamily="49" charset="0"/>
-                <a:cs typeface="Consolas" panose="020B0609020204030204" pitchFamily="49" charset="0"/>
-              </a:rPr>
+              <a:rPr lang="en-US" dirty="0" err="1"/>
               <a:t>myModule</a:t>
             </a:r>
             <a:r>
-              <a:rPr lang="en-US" dirty="0">
-                <a:latin typeface="Consolas" panose="020B0609020204030204" pitchFamily="49" charset="0"/>
-                <a:cs typeface="Consolas" panose="020B0609020204030204" pitchFamily="49" charset="0"/>
-              </a:rPr>
-              <a:t> = rewire("../</a:t>
-            </a:r>
-            <a:r>
-              <a:rPr lang="en-US" dirty="0" err="1">
-                <a:latin typeface="Consolas" panose="020B0609020204030204" pitchFamily="49" charset="0"/>
-                <a:cs typeface="Consolas" panose="020B0609020204030204" pitchFamily="49" charset="0"/>
-              </a:rPr>
-              <a:t>readfile</a:t>
-            </a:r>
-            <a:r>
-              <a:rPr lang="en-US" dirty="0">
-                <a:latin typeface="Consolas" panose="020B0609020204030204" pitchFamily="49" charset="0"/>
-                <a:cs typeface="Consolas" panose="020B0609020204030204" pitchFamily="49" charset="0"/>
-              </a:rPr>
-              <a:t>");</a:t>
-            </a:r>
-          </a:p>
-          <a:p>
-            <a:pPr marL="0" indent="0">
-              <a:lnSpc>
-                <a:spcPct val="120000"/>
-              </a:lnSpc>
-              <a:spcBef>
-                <a:spcPts val="0"/>
-              </a:spcBef>
-              <a:buNone/>
-            </a:pPr>
-            <a:r>
-              <a:rPr lang="en-US" dirty="0">
-                <a:latin typeface="Consolas" panose="020B0609020204030204" pitchFamily="49" charset="0"/>
-                <a:cs typeface="Consolas" panose="020B0609020204030204" pitchFamily="49" charset="0"/>
-              </a:rPr>
-              <a:t>      var </a:t>
-            </a:r>
-            <a:r>
-              <a:rPr lang="en-US" dirty="0" err="1">
-                <a:latin typeface="Consolas" panose="020B0609020204030204" pitchFamily="49" charset="0"/>
-                <a:cs typeface="Consolas" panose="020B0609020204030204" pitchFamily="49" charset="0"/>
-              </a:rPr>
-              <a:t>newIdeaFunction</a:t>
-            </a:r>
-            <a:r>
-              <a:rPr lang="en-US" dirty="0">
-                <a:latin typeface="Consolas" panose="020B0609020204030204" pitchFamily="49" charset="0"/>
-                <a:cs typeface="Consolas" panose="020B0609020204030204" pitchFamily="49" charset="0"/>
-              </a:rPr>
-              <a:t> = (</a:t>
-            </a:r>
-            <a:r>
-              <a:rPr lang="en-US" dirty="0" err="1">
-                <a:latin typeface="Consolas" panose="020B0609020204030204" pitchFamily="49" charset="0"/>
-                <a:cs typeface="Consolas" panose="020B0609020204030204" pitchFamily="49" charset="0"/>
-              </a:rPr>
-              <a:t>cb</a:t>
-            </a:r>
-            <a:r>
-              <a:rPr lang="en-US" dirty="0">
-                <a:latin typeface="Consolas" panose="020B0609020204030204" pitchFamily="49" charset="0"/>
-                <a:cs typeface="Consolas" panose="020B0609020204030204" pitchFamily="49" charset="0"/>
-              </a:rPr>
-              <a:t>) =&gt;{</a:t>
-            </a:r>
-          </a:p>
-          <a:p>
-            <a:pPr marL="0" indent="0">
-              <a:lnSpc>
-                <a:spcPct val="120000"/>
-              </a:lnSpc>
-              <a:spcBef>
-                <a:spcPts val="0"/>
-              </a:spcBef>
-              <a:buNone/>
-            </a:pPr>
-            <a:r>
-              <a:rPr lang="en-US" dirty="0">
-                <a:latin typeface="Consolas" panose="020B0609020204030204" pitchFamily="49" charset="0"/>
-                <a:cs typeface="Consolas" panose="020B0609020204030204" pitchFamily="49" charset="0"/>
-              </a:rPr>
+              <a:rPr lang="en-US" dirty="0"/>
+              <a:t> = rewire("./RF");</a:t>
+            </a:r>
+          </a:p>
+          <a:p>
+            <a:pPr marL="0" indent="0">
+              <a:buNone/>
+            </a:pPr>
+            <a:r>
+              <a:rPr lang="en-US" dirty="0"/>
+              <a:t>      </a:t>
+            </a:r>
+            <a:r>
+              <a:rPr lang="en-US" dirty="0" err="1"/>
+              <a:t>myModule</a:t>
+            </a:r>
+            <a:r>
+              <a:rPr lang="en-US" dirty="0"/>
+              <a:t>.__set__({</a:t>
+            </a:r>
+          </a:p>
+          <a:p>
+            <a:pPr marL="0" indent="0">
+              <a:buNone/>
+            </a:pPr>
+            <a:r>
+              <a:rPr lang="en-US" dirty="0"/>
+              <a:t>        path: "/the/disk"</a:t>
+            </a:r>
+          </a:p>
+          <a:p>
+            <a:pPr marL="0" indent="0">
+              <a:buNone/>
+            </a:pPr>
+            <a:r>
+              <a:rPr lang="en-US" dirty="0"/>
+              <a:t>      });</a:t>
+            </a:r>
+          </a:p>
+          <a:p>
+            <a:pPr marL="0" indent="0">
+              <a:buNone/>
+            </a:pPr>
+            <a:r>
+              <a:rPr lang="en-US" dirty="0"/>
+              <a:t>      </a:t>
+            </a:r>
+            <a:r>
+              <a:rPr lang="en-US" dirty="0" err="1"/>
+              <a:t>myModule.readSomethingFromFileSystem</a:t>
+            </a:r>
+            <a:r>
+              <a:rPr lang="en-US" dirty="0"/>
+              <a:t>(function (err, data) {</a:t>
+            </a:r>
+          </a:p>
+          <a:p>
+            <a:pPr marL="0" indent="0">
+              <a:buNone/>
+            </a:pPr>
+            <a:r>
+              <a:rPr lang="en-US" dirty="0"/>
               <a:t>        </a:t>
             </a:r>
             <a:r>
-              <a:rPr lang="en-US" dirty="0" err="1">
-                <a:latin typeface="Consolas" panose="020B0609020204030204" pitchFamily="49" charset="0"/>
-                <a:cs typeface="Consolas" panose="020B0609020204030204" pitchFamily="49" charset="0"/>
-              </a:rPr>
-              <a:t>cb</a:t>
-            </a:r>
-            <a:r>
-              <a:rPr lang="en-US" dirty="0">
-                <a:latin typeface="Consolas" panose="020B0609020204030204" pitchFamily="49" charset="0"/>
-                <a:cs typeface="Consolas" panose="020B0609020204030204" pitchFamily="49" charset="0"/>
-              </a:rPr>
-              <a:t>(null, "Success!");</a:t>
-            </a:r>
-          </a:p>
-          <a:p>
-            <a:pPr marL="0" indent="0">
-              <a:lnSpc>
-                <a:spcPct val="120000"/>
-              </a:lnSpc>
-              <a:spcBef>
-                <a:spcPts val="0"/>
-              </a:spcBef>
-              <a:buNone/>
-            </a:pPr>
-            <a:r>
-              <a:rPr lang="en-US" dirty="0">
-                <a:latin typeface="Consolas" panose="020B0609020204030204" pitchFamily="49" charset="0"/>
-                <a:cs typeface="Consolas" panose="020B0609020204030204" pitchFamily="49" charset="0"/>
-              </a:rPr>
-              <a:t>        </a:t>
-            </a:r>
-            <a:r>
-              <a:rPr lang="en-US" dirty="0" err="1">
-                <a:latin typeface="Consolas" panose="020B0609020204030204" pitchFamily="49" charset="0"/>
-                <a:cs typeface="Consolas" panose="020B0609020204030204" pitchFamily="49" charset="0"/>
-              </a:rPr>
+              <a:rPr lang="en-US" dirty="0" err="1"/>
               <a:t>console.log</a:t>
             </a:r>
             <a:r>
-              <a:rPr lang="en-US" dirty="0">
-                <a:latin typeface="Consolas" panose="020B0609020204030204" pitchFamily="49" charset="0"/>
-                <a:cs typeface="Consolas" panose="020B0609020204030204" pitchFamily="49" charset="0"/>
-              </a:rPr>
-              <a:t>("new idea ...");</a:t>
-            </a:r>
-          </a:p>
-          <a:p>
-            <a:pPr marL="0" indent="0">
-              <a:lnSpc>
-                <a:spcPct val="120000"/>
-              </a:lnSpc>
-              <a:spcBef>
-                <a:spcPts val="0"/>
-              </a:spcBef>
-              <a:buNone/>
-            </a:pPr>
-            <a:r>
-              <a:rPr lang="en-US" dirty="0">
-                <a:latin typeface="Consolas" panose="020B0609020204030204" pitchFamily="49" charset="0"/>
-                <a:cs typeface="Consolas" panose="020B0609020204030204" pitchFamily="49" charset="0"/>
-              </a:rPr>
-              <a:t>      }</a:t>
-            </a:r>
-          </a:p>
-          <a:p>
-            <a:pPr marL="0" indent="0">
-              <a:lnSpc>
-                <a:spcPct val="120000"/>
-              </a:lnSpc>
-              <a:spcBef>
-                <a:spcPts val="0"/>
-              </a:spcBef>
-              <a:buNone/>
-            </a:pPr>
-            <a:r>
-              <a:rPr lang="en-US" dirty="0">
-                <a:latin typeface="Consolas" panose="020B0609020204030204" pitchFamily="49" charset="0"/>
-                <a:cs typeface="Consolas" panose="020B0609020204030204" pitchFamily="49" charset="0"/>
-              </a:rPr>
-              <a:t>      </a:t>
-            </a:r>
-            <a:r>
-              <a:rPr lang="en-US" dirty="0" err="1">
-                <a:latin typeface="Consolas" panose="020B0609020204030204" pitchFamily="49" charset="0"/>
-                <a:cs typeface="Consolas" panose="020B0609020204030204" pitchFamily="49" charset="0"/>
-              </a:rPr>
-              <a:t>myModule</a:t>
-            </a:r>
-            <a:r>
-              <a:rPr lang="en-US" dirty="0">
-                <a:latin typeface="Consolas" panose="020B0609020204030204" pitchFamily="49" charset="0"/>
-                <a:cs typeface="Consolas" panose="020B0609020204030204" pitchFamily="49" charset="0"/>
-              </a:rPr>
-              <a:t>.__set__({</a:t>
-            </a:r>
-          </a:p>
-          <a:p>
-            <a:pPr marL="0" indent="0">
-              <a:lnSpc>
-                <a:spcPct val="120000"/>
-              </a:lnSpc>
-              <a:spcBef>
-                <a:spcPts val="0"/>
-              </a:spcBef>
-              <a:buNone/>
-            </a:pPr>
-            <a:r>
-              <a:rPr lang="en-US" dirty="0">
-                <a:latin typeface="Consolas" panose="020B0609020204030204" pitchFamily="49" charset="0"/>
-                <a:cs typeface="Consolas" panose="020B0609020204030204" pitchFamily="49" charset="0"/>
-              </a:rPr>
-              <a:t>        </a:t>
-            </a:r>
-            <a:r>
-              <a:rPr lang="en-US" dirty="0" err="1">
-                <a:latin typeface="Consolas" panose="020B0609020204030204" pitchFamily="49" charset="0"/>
-                <a:cs typeface="Consolas" panose="020B0609020204030204" pitchFamily="49" charset="0"/>
-              </a:rPr>
-              <a:t>noIdea</a:t>
-            </a:r>
-            <a:r>
-              <a:rPr lang="en-US" dirty="0">
-                <a:latin typeface="Consolas" panose="020B0609020204030204" pitchFamily="49" charset="0"/>
-                <a:cs typeface="Consolas" panose="020B0609020204030204" pitchFamily="49" charset="0"/>
-              </a:rPr>
-              <a:t>: </a:t>
-            </a:r>
-            <a:r>
-              <a:rPr lang="en-US" dirty="0" err="1">
-                <a:latin typeface="Consolas" panose="020B0609020204030204" pitchFamily="49" charset="0"/>
-                <a:cs typeface="Consolas" panose="020B0609020204030204" pitchFamily="49" charset="0"/>
-              </a:rPr>
-              <a:t>rsffs</a:t>
-            </a:r>
-            <a:r>
-              <a:rPr lang="en-US" dirty="0">
-                <a:latin typeface="Consolas" panose="020B0609020204030204" pitchFamily="49" charset="0"/>
-                <a:cs typeface="Consolas" panose="020B0609020204030204" pitchFamily="49" charset="0"/>
-              </a:rPr>
-              <a:t>,</a:t>
-            </a:r>
-          </a:p>
-          <a:p>
-            <a:pPr marL="0" indent="0">
-              <a:lnSpc>
-                <a:spcPct val="120000"/>
-              </a:lnSpc>
-              <a:spcBef>
-                <a:spcPts val="0"/>
-              </a:spcBef>
-              <a:buNone/>
-            </a:pPr>
-            <a:r>
-              <a:rPr lang="en-US" dirty="0">
-                <a:latin typeface="Consolas" panose="020B0609020204030204" pitchFamily="49" charset="0"/>
-                <a:cs typeface="Consolas" panose="020B0609020204030204" pitchFamily="49" charset="0"/>
-              </a:rPr>
-              <a:t>        path: "/the/disk"</a:t>
-            </a:r>
-          </a:p>
-          <a:p>
-            <a:pPr marL="0" indent="0">
-              <a:lnSpc>
-                <a:spcPct val="120000"/>
-              </a:lnSpc>
-              <a:spcBef>
-                <a:spcPts val="0"/>
-              </a:spcBef>
-              <a:buNone/>
-            </a:pPr>
-            <a:r>
-              <a:rPr lang="en-US" dirty="0">
-                <a:latin typeface="Consolas" panose="020B0609020204030204" pitchFamily="49" charset="0"/>
-                <a:cs typeface="Consolas" panose="020B0609020204030204" pitchFamily="49" charset="0"/>
-              </a:rPr>
-              <a:t>      });</a:t>
-            </a:r>
-          </a:p>
-          <a:p>
-            <a:pPr marL="0" indent="0">
-              <a:lnSpc>
-                <a:spcPct val="120000"/>
-              </a:lnSpc>
-              <a:spcBef>
-                <a:spcPts val="0"/>
-              </a:spcBef>
-              <a:buNone/>
-            </a:pPr>
-            <a:r>
-              <a:rPr lang="en-US" dirty="0">
-                <a:latin typeface="Consolas" panose="020B0609020204030204" pitchFamily="49" charset="0"/>
-                <a:cs typeface="Consolas" panose="020B0609020204030204" pitchFamily="49" charset="0"/>
-              </a:rPr>
-              <a:t>      </a:t>
-            </a:r>
-            <a:r>
-              <a:rPr lang="en-US" dirty="0" err="1">
-                <a:latin typeface="Consolas" panose="020B0609020204030204" pitchFamily="49" charset="0"/>
-                <a:cs typeface="Consolas" panose="020B0609020204030204" pitchFamily="49" charset="0"/>
-              </a:rPr>
-              <a:t>myModule.readSomethingFromFileSystem</a:t>
-            </a:r>
-            <a:r>
-              <a:rPr lang="en-US" dirty="0">
-                <a:latin typeface="Consolas" panose="020B0609020204030204" pitchFamily="49" charset="0"/>
-                <a:cs typeface="Consolas" panose="020B0609020204030204" pitchFamily="49" charset="0"/>
-              </a:rPr>
-              <a:t>(function (err, data) {</a:t>
-            </a:r>
-          </a:p>
-          <a:p>
-            <a:pPr marL="0" indent="0">
-              <a:lnSpc>
-                <a:spcPct val="120000"/>
-              </a:lnSpc>
-              <a:spcBef>
-                <a:spcPts val="0"/>
-              </a:spcBef>
-              <a:buNone/>
-            </a:pPr>
-            <a:r>
-              <a:rPr lang="en-US" dirty="0">
-                <a:latin typeface="Consolas" panose="020B0609020204030204" pitchFamily="49" charset="0"/>
-                <a:cs typeface="Consolas" panose="020B0609020204030204" pitchFamily="49" charset="0"/>
-              </a:rPr>
-              <a:t>        </a:t>
-            </a:r>
-            <a:r>
-              <a:rPr lang="en-US" dirty="0" err="1">
-                <a:latin typeface="Consolas" panose="020B0609020204030204" pitchFamily="49" charset="0"/>
-                <a:cs typeface="Consolas" panose="020B0609020204030204" pitchFamily="49" charset="0"/>
-              </a:rPr>
-              <a:t>console.log</a:t>
-            </a:r>
-            <a:r>
-              <a:rPr lang="en-US" dirty="0">
-                <a:latin typeface="Consolas" panose="020B0609020204030204" pitchFamily="49" charset="0"/>
-                <a:cs typeface="Consolas" panose="020B0609020204030204" pitchFamily="49" charset="0"/>
-              </a:rPr>
+              <a:rPr lang="en-US" dirty="0"/>
               <a:t>(data); // = Success!</a:t>
             </a:r>
           </a:p>
           <a:p>
             <a:pPr marL="0" indent="0">
-              <a:lnSpc>
-                <a:spcPct val="120000"/>
-              </a:lnSpc>
-              <a:spcBef>
-                <a:spcPts val="0"/>
-              </a:spcBef>
-              <a:buNone/>
-            </a:pPr>
-            <a:r>
-              <a:rPr lang="en-US" dirty="0">
-                <a:latin typeface="Consolas" panose="020B0609020204030204" pitchFamily="49" charset="0"/>
-                <a:cs typeface="Consolas" panose="020B0609020204030204" pitchFamily="49" charset="0"/>
-              </a:rPr>
-              <a:t>      });</a:t>
-            </a:r>
-          </a:p>
-          <a:p>
-            <a:pPr marL="0" indent="0">
-              <a:lnSpc>
-                <a:spcPct val="120000"/>
-              </a:lnSpc>
-              <a:spcBef>
-                <a:spcPts val="0"/>
-              </a:spcBef>
-              <a:buNone/>
-            </a:pPr>
-            <a:r>
-              <a:rPr lang="en-US" dirty="0">
-                <a:latin typeface="Consolas" panose="020B0609020204030204" pitchFamily="49" charset="0"/>
-                <a:cs typeface="Consolas" panose="020B0609020204030204" pitchFamily="49" charset="0"/>
-              </a:rPr>
+              <a:buNone/>
+            </a:pPr>
+            <a:r>
+              <a:rPr lang="en-US" dirty="0"/>
+              <a:t>      })</a:t>
+            </a:r>
+          </a:p>
+          <a:p>
+            <a:pPr marL="0" indent="0">
+              <a:buNone/>
+            </a:pPr>
+            <a:r>
+              <a:rPr lang="en-US" dirty="0"/>
               <a:t>    })</a:t>
             </a:r>
           </a:p>
           <a:p>
             <a:pPr marL="0" indent="0">
-              <a:lnSpc>
-                <a:spcPct val="120000"/>
-              </a:lnSpc>
-              <a:spcBef>
-                <a:spcPts val="0"/>
-              </a:spcBef>
-              <a:buNone/>
-            </a:pPr>
-            <a:r>
-              <a:rPr lang="en-US" dirty="0">
-                <a:latin typeface="Consolas" panose="020B0609020204030204" pitchFamily="49" charset="0"/>
-                <a:cs typeface="Consolas" panose="020B0609020204030204" pitchFamily="49" charset="0"/>
-              </a:rPr>
+              <a:buNone/>
+            </a:pPr>
+            <a:r>
+              <a:rPr lang="en-US" dirty="0"/>
               <a:t>  })</a:t>
             </a:r>
           </a:p>
           <a:p>
             <a:pPr marL="0" indent="0">
-              <a:lnSpc>
-                <a:spcPct val="120000"/>
-              </a:lnSpc>
-              <a:spcBef>
-                <a:spcPts val="0"/>
-              </a:spcBef>
-              <a:buNone/>
-            </a:pPr>
-            <a:r>
-              <a:rPr lang="en-US" dirty="0">
-                <a:latin typeface="Consolas" panose="020B0609020204030204" pitchFamily="49" charset="0"/>
-                <a:cs typeface="Consolas" panose="020B0609020204030204" pitchFamily="49" charset="0"/>
-              </a:rPr>
+              <a:buNone/>
+            </a:pPr>
+            <a:r>
+              <a:rPr lang="en-US" dirty="0"/>
               <a:t>})</a:t>
             </a:r>
           </a:p>

</xml_diff>